<commit_message>
App icon + new documentation
</commit_message>
<xml_diff>
--- a/Documentation - PL/ZTP Dokumentation.pptx
+++ b/Documentation - PL/ZTP Dokumentation.pptx
@@ -4,6 +4,9 @@
   <p:sldMasterIdLst>
     <p:sldMasterId id="2147483660" r:id="rId1"/>
   </p:sldMasterIdLst>
+  <p:notesMasterIdLst>
+    <p:notesMasterId r:id="rId28"/>
+  </p:notesMasterIdLst>
   <p:sldIdLst>
     <p:sldId id="256" r:id="rId2"/>
     <p:sldId id="257" r:id="rId3"/>
@@ -135,6 +138,2539 @@
     </p:ext>
   </p:extLst>
 </p:presentation>
+</file>
+
+<file path=ppt/notesMasters/notesMaster1.xml><?xml version="1.0" encoding="utf-8"?>
+<p:notesMaster xmlns:a="http://schemas.openxmlformats.org/drawingml/2006/main" xmlns:r="http://schemas.openxmlformats.org/officeDocument/2006/relationships" xmlns:p="http://schemas.openxmlformats.org/presentationml/2006/main">
+  <p:cSld>
+    <p:bg>
+      <p:bgRef idx="1001">
+        <a:schemeClr val="bg1"/>
+      </p:bgRef>
+    </p:bg>
+    <p:spTree>
+      <p:nvGrpSpPr>
+        <p:cNvPr id="1" name=""/>
+        <p:cNvGrpSpPr/>
+        <p:nvPr/>
+      </p:nvGrpSpPr>
+      <p:grpSpPr>
+        <a:xfrm>
+          <a:off x="0" y="0"/>
+          <a:ext cx="0" cy="0"/>
+          <a:chOff x="0" y="0"/>
+          <a:chExt cx="0" cy="0"/>
+        </a:xfrm>
+      </p:grpSpPr>
+      <p:sp>
+        <p:nvSpPr>
+          <p:cNvPr id="2" name="Symbol zastępczy nagłówka 1"/>
+          <p:cNvSpPr>
+            <a:spLocks noGrp="1"/>
+          </p:cNvSpPr>
+          <p:nvPr>
+            <p:ph type="hdr" sz="quarter"/>
+          </p:nvPr>
+        </p:nvSpPr>
+        <p:spPr>
+          <a:xfrm>
+            <a:off x="0" y="0"/>
+            <a:ext cx="2971800" cy="458788"/>
+          </a:xfrm>
+          <a:prstGeom prst="rect">
+            <a:avLst/>
+          </a:prstGeom>
+        </p:spPr>
+        <p:txBody>
+          <a:bodyPr vert="horz" lIns="91440" tIns="45720" rIns="91440" bIns="45720" rtlCol="0"/>
+          <a:lstStyle>
+            <a:lvl1pPr algn="l">
+              <a:defRPr sz="1200"/>
+            </a:lvl1pPr>
+          </a:lstStyle>
+          <a:p>
+            <a:endParaRPr lang="pl-PL"/>
+          </a:p>
+        </p:txBody>
+      </p:sp>
+      <p:sp>
+        <p:nvSpPr>
+          <p:cNvPr id="3" name="Symbol zastępczy daty 2"/>
+          <p:cNvSpPr>
+            <a:spLocks noGrp="1"/>
+          </p:cNvSpPr>
+          <p:nvPr>
+            <p:ph type="dt" idx="1"/>
+          </p:nvPr>
+        </p:nvSpPr>
+        <p:spPr>
+          <a:xfrm>
+            <a:off x="3884613" y="0"/>
+            <a:ext cx="2971800" cy="458788"/>
+          </a:xfrm>
+          <a:prstGeom prst="rect">
+            <a:avLst/>
+          </a:prstGeom>
+        </p:spPr>
+        <p:txBody>
+          <a:bodyPr vert="horz" lIns="91440" tIns="45720" rIns="91440" bIns="45720" rtlCol="0"/>
+          <a:lstStyle>
+            <a:lvl1pPr algn="r">
+              <a:defRPr sz="1200"/>
+            </a:lvl1pPr>
+          </a:lstStyle>
+          <a:p>
+            <a:fld id="{7C2430AA-EDF6-4DBF-80B2-609DE0CD757D}" type="datetimeFigureOut">
+              <a:rPr lang="pl-PL" smtClean="0"/>
+              <a:t>2018-12-14</a:t>
+            </a:fld>
+            <a:endParaRPr lang="pl-PL"/>
+          </a:p>
+        </p:txBody>
+      </p:sp>
+      <p:sp>
+        <p:nvSpPr>
+          <p:cNvPr id="4" name="Symbol zastępczy obrazu slajdu 3"/>
+          <p:cNvSpPr>
+            <a:spLocks noGrp="1" noRot="1" noChangeAspect="1"/>
+          </p:cNvSpPr>
+          <p:nvPr>
+            <p:ph type="sldImg" idx="2"/>
+          </p:nvPr>
+        </p:nvSpPr>
+        <p:spPr>
+          <a:xfrm>
+            <a:off x="685800" y="1143000"/>
+            <a:ext cx="5486400" cy="3086100"/>
+          </a:xfrm>
+          <a:prstGeom prst="rect">
+            <a:avLst/>
+          </a:prstGeom>
+          <a:noFill/>
+          <a:ln w="12700">
+            <a:solidFill>
+              <a:prstClr val="black"/>
+            </a:solidFill>
+          </a:ln>
+        </p:spPr>
+        <p:txBody>
+          <a:bodyPr vert="horz" lIns="91440" tIns="45720" rIns="91440" bIns="45720" rtlCol="0" anchor="ctr"/>
+          <a:lstStyle/>
+          <a:p>
+            <a:endParaRPr lang="pl-PL"/>
+          </a:p>
+        </p:txBody>
+      </p:sp>
+      <p:sp>
+        <p:nvSpPr>
+          <p:cNvPr id="5" name="Symbol zastępczy notatek 4"/>
+          <p:cNvSpPr>
+            <a:spLocks noGrp="1"/>
+          </p:cNvSpPr>
+          <p:nvPr>
+            <p:ph type="body" sz="quarter" idx="3"/>
+          </p:nvPr>
+        </p:nvSpPr>
+        <p:spPr>
+          <a:xfrm>
+            <a:off x="685800" y="4400550"/>
+            <a:ext cx="5486400" cy="3600450"/>
+          </a:xfrm>
+          <a:prstGeom prst="rect">
+            <a:avLst/>
+          </a:prstGeom>
+        </p:spPr>
+        <p:txBody>
+          <a:bodyPr vert="horz" lIns="91440" tIns="45720" rIns="91440" bIns="45720" rtlCol="0"/>
+          <a:lstStyle/>
+          <a:p>
+            <a:pPr lvl="0"/>
+            <a:r>
+              <a:rPr lang="pl-PL"/>
+              <a:t>Edytuj style wzorca tekstu</a:t>
+            </a:r>
+          </a:p>
+          <a:p>
+            <a:pPr lvl="1"/>
+            <a:r>
+              <a:rPr lang="pl-PL"/>
+              <a:t>Drugi poziom</a:t>
+            </a:r>
+          </a:p>
+          <a:p>
+            <a:pPr lvl="2"/>
+            <a:r>
+              <a:rPr lang="pl-PL"/>
+              <a:t>Trzeci poziom</a:t>
+            </a:r>
+          </a:p>
+          <a:p>
+            <a:pPr lvl="3"/>
+            <a:r>
+              <a:rPr lang="pl-PL"/>
+              <a:t>Czwarty poziom</a:t>
+            </a:r>
+          </a:p>
+          <a:p>
+            <a:pPr lvl="4"/>
+            <a:r>
+              <a:rPr lang="pl-PL"/>
+              <a:t>Piąty poziom</a:t>
+            </a:r>
+          </a:p>
+        </p:txBody>
+      </p:sp>
+      <p:sp>
+        <p:nvSpPr>
+          <p:cNvPr id="6" name="Symbol zastępczy stopki 5"/>
+          <p:cNvSpPr>
+            <a:spLocks noGrp="1"/>
+          </p:cNvSpPr>
+          <p:nvPr>
+            <p:ph type="ftr" sz="quarter" idx="4"/>
+          </p:nvPr>
+        </p:nvSpPr>
+        <p:spPr>
+          <a:xfrm>
+            <a:off x="0" y="8685213"/>
+            <a:ext cx="2971800" cy="458787"/>
+          </a:xfrm>
+          <a:prstGeom prst="rect">
+            <a:avLst/>
+          </a:prstGeom>
+        </p:spPr>
+        <p:txBody>
+          <a:bodyPr vert="horz" lIns="91440" tIns="45720" rIns="91440" bIns="45720" rtlCol="0" anchor="b"/>
+          <a:lstStyle>
+            <a:lvl1pPr algn="l">
+              <a:defRPr sz="1200"/>
+            </a:lvl1pPr>
+          </a:lstStyle>
+          <a:p>
+            <a:endParaRPr lang="pl-PL"/>
+          </a:p>
+        </p:txBody>
+      </p:sp>
+      <p:sp>
+        <p:nvSpPr>
+          <p:cNvPr id="7" name="Symbol zastępczy numeru slajdu 6"/>
+          <p:cNvSpPr>
+            <a:spLocks noGrp="1"/>
+          </p:cNvSpPr>
+          <p:nvPr>
+            <p:ph type="sldNum" sz="quarter" idx="5"/>
+          </p:nvPr>
+        </p:nvSpPr>
+        <p:spPr>
+          <a:xfrm>
+            <a:off x="3884613" y="8685213"/>
+            <a:ext cx="2971800" cy="458787"/>
+          </a:xfrm>
+          <a:prstGeom prst="rect">
+            <a:avLst/>
+          </a:prstGeom>
+        </p:spPr>
+        <p:txBody>
+          <a:bodyPr vert="horz" lIns="91440" tIns="45720" rIns="91440" bIns="45720" rtlCol="0" anchor="b"/>
+          <a:lstStyle>
+            <a:lvl1pPr algn="r">
+              <a:defRPr sz="1200"/>
+            </a:lvl1pPr>
+          </a:lstStyle>
+          <a:p>
+            <a:fld id="{FCA74D20-1EA3-4C23-8DFB-55EEDCA4B4AA}" type="slidenum">
+              <a:rPr lang="pl-PL" smtClean="0"/>
+              <a:t>‹#›</a:t>
+            </a:fld>
+            <a:endParaRPr lang="pl-PL"/>
+          </a:p>
+        </p:txBody>
+      </p:sp>
+    </p:spTree>
+    <p:extLst>
+      <p:ext uri="{BB962C8B-B14F-4D97-AF65-F5344CB8AC3E}">
+        <p14:creationId xmlns:p14="http://schemas.microsoft.com/office/powerpoint/2010/main" val="3068503766"/>
+      </p:ext>
+    </p:extLst>
+  </p:cSld>
+  <p:clrMap bg1="lt1" tx1="dk1" bg2="lt2" tx2="dk2" accent1="accent1" accent2="accent2" accent3="accent3" accent4="accent4" accent5="accent5" accent6="accent6" hlink="hlink" folHlink="folHlink"/>
+  <p:notesStyle>
+    <a:lvl1pPr marL="0" algn="l" defTabSz="914400" rtl="0" eaLnBrk="1" latinLnBrk="0" hangingPunct="1">
+      <a:defRPr sz="1200" kern="1200">
+        <a:solidFill>
+          <a:schemeClr val="tx1"/>
+        </a:solidFill>
+        <a:latin typeface="+mn-lt"/>
+        <a:ea typeface="+mn-ea"/>
+        <a:cs typeface="+mn-cs"/>
+      </a:defRPr>
+    </a:lvl1pPr>
+    <a:lvl2pPr marL="457200" algn="l" defTabSz="914400" rtl="0" eaLnBrk="1" latinLnBrk="0" hangingPunct="1">
+      <a:defRPr sz="1200" kern="1200">
+        <a:solidFill>
+          <a:schemeClr val="tx1"/>
+        </a:solidFill>
+        <a:latin typeface="+mn-lt"/>
+        <a:ea typeface="+mn-ea"/>
+        <a:cs typeface="+mn-cs"/>
+      </a:defRPr>
+    </a:lvl2pPr>
+    <a:lvl3pPr marL="914400" algn="l" defTabSz="914400" rtl="0" eaLnBrk="1" latinLnBrk="0" hangingPunct="1">
+      <a:defRPr sz="1200" kern="1200">
+        <a:solidFill>
+          <a:schemeClr val="tx1"/>
+        </a:solidFill>
+        <a:latin typeface="+mn-lt"/>
+        <a:ea typeface="+mn-ea"/>
+        <a:cs typeface="+mn-cs"/>
+      </a:defRPr>
+    </a:lvl3pPr>
+    <a:lvl4pPr marL="1371600" algn="l" defTabSz="914400" rtl="0" eaLnBrk="1" latinLnBrk="0" hangingPunct="1">
+      <a:defRPr sz="1200" kern="1200">
+        <a:solidFill>
+          <a:schemeClr val="tx1"/>
+        </a:solidFill>
+        <a:latin typeface="+mn-lt"/>
+        <a:ea typeface="+mn-ea"/>
+        <a:cs typeface="+mn-cs"/>
+      </a:defRPr>
+    </a:lvl4pPr>
+    <a:lvl5pPr marL="1828800" algn="l" defTabSz="914400" rtl="0" eaLnBrk="1" latinLnBrk="0" hangingPunct="1">
+      <a:defRPr sz="1200" kern="1200">
+        <a:solidFill>
+          <a:schemeClr val="tx1"/>
+        </a:solidFill>
+        <a:latin typeface="+mn-lt"/>
+        <a:ea typeface="+mn-ea"/>
+        <a:cs typeface="+mn-cs"/>
+      </a:defRPr>
+    </a:lvl5pPr>
+    <a:lvl6pPr marL="2286000" algn="l" defTabSz="914400" rtl="0" eaLnBrk="1" latinLnBrk="0" hangingPunct="1">
+      <a:defRPr sz="1200" kern="1200">
+        <a:solidFill>
+          <a:schemeClr val="tx1"/>
+        </a:solidFill>
+        <a:latin typeface="+mn-lt"/>
+        <a:ea typeface="+mn-ea"/>
+        <a:cs typeface="+mn-cs"/>
+      </a:defRPr>
+    </a:lvl6pPr>
+    <a:lvl7pPr marL="2743200" algn="l" defTabSz="914400" rtl="0" eaLnBrk="1" latinLnBrk="0" hangingPunct="1">
+      <a:defRPr sz="1200" kern="1200">
+        <a:solidFill>
+          <a:schemeClr val="tx1"/>
+        </a:solidFill>
+        <a:latin typeface="+mn-lt"/>
+        <a:ea typeface="+mn-ea"/>
+        <a:cs typeface="+mn-cs"/>
+      </a:defRPr>
+    </a:lvl7pPr>
+    <a:lvl8pPr marL="3200400" algn="l" defTabSz="914400" rtl="0" eaLnBrk="1" latinLnBrk="0" hangingPunct="1">
+      <a:defRPr sz="1200" kern="1200">
+        <a:solidFill>
+          <a:schemeClr val="tx1"/>
+        </a:solidFill>
+        <a:latin typeface="+mn-lt"/>
+        <a:ea typeface="+mn-ea"/>
+        <a:cs typeface="+mn-cs"/>
+      </a:defRPr>
+    </a:lvl8pPr>
+    <a:lvl9pPr marL="3657600" algn="l" defTabSz="914400" rtl="0" eaLnBrk="1" latinLnBrk="0" hangingPunct="1">
+      <a:defRPr sz="1200" kern="1200">
+        <a:solidFill>
+          <a:schemeClr val="tx1"/>
+        </a:solidFill>
+        <a:latin typeface="+mn-lt"/>
+        <a:ea typeface="+mn-ea"/>
+        <a:cs typeface="+mn-cs"/>
+      </a:defRPr>
+    </a:lvl9pPr>
+  </p:notesStyle>
+</p:notesMaster>
+</file>
+
+<file path=ppt/notesSlides/notesSlide1.xml><?xml version="1.0" encoding="utf-8"?>
+<p:notes xmlns:a="http://schemas.openxmlformats.org/drawingml/2006/main" xmlns:r="http://schemas.openxmlformats.org/officeDocument/2006/relationships" xmlns:p="http://schemas.openxmlformats.org/presentationml/2006/main">
+  <p:cSld>
+    <p:spTree>
+      <p:nvGrpSpPr>
+        <p:cNvPr id="1" name=""/>
+        <p:cNvGrpSpPr/>
+        <p:nvPr/>
+      </p:nvGrpSpPr>
+      <p:grpSpPr>
+        <a:xfrm>
+          <a:off x="0" y="0"/>
+          <a:ext cx="0" cy="0"/>
+          <a:chOff x="0" y="0"/>
+          <a:chExt cx="0" cy="0"/>
+        </a:xfrm>
+      </p:grpSpPr>
+      <p:sp>
+        <p:nvSpPr>
+          <p:cNvPr id="2" name="Symbol zastępczy obrazu slajdu 1"/>
+          <p:cNvSpPr>
+            <a:spLocks noGrp="1" noRot="1" noChangeAspect="1"/>
+          </p:cNvSpPr>
+          <p:nvPr>
+            <p:ph type="sldImg"/>
+          </p:nvPr>
+        </p:nvSpPr>
+        <p:spPr/>
+      </p:sp>
+      <p:sp>
+        <p:nvSpPr>
+          <p:cNvPr id="3" name="Symbol zastępczy notatek 2"/>
+          <p:cNvSpPr>
+            <a:spLocks noGrp="1"/>
+          </p:cNvSpPr>
+          <p:nvPr>
+            <p:ph type="body" idx="1"/>
+          </p:nvPr>
+        </p:nvSpPr>
+        <p:spPr/>
+        <p:txBody>
+          <a:bodyPr/>
+          <a:lstStyle/>
+          <a:p>
+            <a:endParaRPr lang="pl-PL"/>
+          </a:p>
+        </p:txBody>
+      </p:sp>
+      <p:sp>
+        <p:nvSpPr>
+          <p:cNvPr id="4" name="Symbol zastępczy numeru slajdu 3"/>
+          <p:cNvSpPr>
+            <a:spLocks noGrp="1"/>
+          </p:cNvSpPr>
+          <p:nvPr>
+            <p:ph type="sldNum" sz="quarter" idx="5"/>
+          </p:nvPr>
+        </p:nvSpPr>
+        <p:spPr/>
+        <p:txBody>
+          <a:bodyPr/>
+          <a:lstStyle/>
+          <a:p>
+            <a:fld id="{FCA74D20-1EA3-4C23-8DFB-55EEDCA4B4AA}" type="slidenum">
+              <a:rPr lang="pl-PL" smtClean="0"/>
+              <a:t>1</a:t>
+            </a:fld>
+            <a:endParaRPr lang="pl-PL"/>
+          </a:p>
+        </p:txBody>
+      </p:sp>
+    </p:spTree>
+    <p:extLst>
+      <p:ext uri="{BB962C8B-B14F-4D97-AF65-F5344CB8AC3E}">
+        <p14:creationId xmlns:p14="http://schemas.microsoft.com/office/powerpoint/2010/main" val="3150087385"/>
+      </p:ext>
+    </p:extLst>
+  </p:cSld>
+  <p:clrMapOvr>
+    <a:masterClrMapping/>
+  </p:clrMapOvr>
+</p:notes>
+</file>
+
+<file path=ppt/notesSlides/notesSlide10.xml><?xml version="1.0" encoding="utf-8"?>
+<p:notes xmlns:a="http://schemas.openxmlformats.org/drawingml/2006/main" xmlns:r="http://schemas.openxmlformats.org/officeDocument/2006/relationships" xmlns:p="http://schemas.openxmlformats.org/presentationml/2006/main">
+  <p:cSld>
+    <p:spTree>
+      <p:nvGrpSpPr>
+        <p:cNvPr id="1" name=""/>
+        <p:cNvGrpSpPr/>
+        <p:nvPr/>
+      </p:nvGrpSpPr>
+      <p:grpSpPr>
+        <a:xfrm>
+          <a:off x="0" y="0"/>
+          <a:ext cx="0" cy="0"/>
+          <a:chOff x="0" y="0"/>
+          <a:chExt cx="0" cy="0"/>
+        </a:xfrm>
+      </p:grpSpPr>
+      <p:sp>
+        <p:nvSpPr>
+          <p:cNvPr id="2" name="Symbol zastępczy obrazu slajdu 1"/>
+          <p:cNvSpPr>
+            <a:spLocks noGrp="1" noRot="1" noChangeAspect="1"/>
+          </p:cNvSpPr>
+          <p:nvPr>
+            <p:ph type="sldImg"/>
+          </p:nvPr>
+        </p:nvSpPr>
+        <p:spPr/>
+      </p:sp>
+      <p:sp>
+        <p:nvSpPr>
+          <p:cNvPr id="3" name="Symbol zastępczy notatek 2"/>
+          <p:cNvSpPr>
+            <a:spLocks noGrp="1"/>
+          </p:cNvSpPr>
+          <p:nvPr>
+            <p:ph type="body" idx="1"/>
+          </p:nvPr>
+        </p:nvSpPr>
+        <p:spPr/>
+        <p:txBody>
+          <a:bodyPr/>
+          <a:lstStyle/>
+          <a:p>
+            <a:endParaRPr lang="pl-PL"/>
+          </a:p>
+        </p:txBody>
+      </p:sp>
+      <p:sp>
+        <p:nvSpPr>
+          <p:cNvPr id="4" name="Symbol zastępczy numeru slajdu 3"/>
+          <p:cNvSpPr>
+            <a:spLocks noGrp="1"/>
+          </p:cNvSpPr>
+          <p:nvPr>
+            <p:ph type="sldNum" sz="quarter" idx="5"/>
+          </p:nvPr>
+        </p:nvSpPr>
+        <p:spPr/>
+        <p:txBody>
+          <a:bodyPr/>
+          <a:lstStyle/>
+          <a:p>
+            <a:fld id="{FCA74D20-1EA3-4C23-8DFB-55EEDCA4B4AA}" type="slidenum">
+              <a:rPr lang="pl-PL" smtClean="0"/>
+              <a:t>10</a:t>
+            </a:fld>
+            <a:endParaRPr lang="pl-PL"/>
+          </a:p>
+        </p:txBody>
+      </p:sp>
+    </p:spTree>
+    <p:extLst>
+      <p:ext uri="{BB962C8B-B14F-4D97-AF65-F5344CB8AC3E}">
+        <p14:creationId xmlns:p14="http://schemas.microsoft.com/office/powerpoint/2010/main" val="2669131934"/>
+      </p:ext>
+    </p:extLst>
+  </p:cSld>
+  <p:clrMapOvr>
+    <a:masterClrMapping/>
+  </p:clrMapOvr>
+</p:notes>
+</file>
+
+<file path=ppt/notesSlides/notesSlide11.xml><?xml version="1.0" encoding="utf-8"?>
+<p:notes xmlns:a="http://schemas.openxmlformats.org/drawingml/2006/main" xmlns:r="http://schemas.openxmlformats.org/officeDocument/2006/relationships" xmlns:p="http://schemas.openxmlformats.org/presentationml/2006/main">
+  <p:cSld>
+    <p:spTree>
+      <p:nvGrpSpPr>
+        <p:cNvPr id="1" name=""/>
+        <p:cNvGrpSpPr/>
+        <p:nvPr/>
+      </p:nvGrpSpPr>
+      <p:grpSpPr>
+        <a:xfrm>
+          <a:off x="0" y="0"/>
+          <a:ext cx="0" cy="0"/>
+          <a:chOff x="0" y="0"/>
+          <a:chExt cx="0" cy="0"/>
+        </a:xfrm>
+      </p:grpSpPr>
+      <p:sp>
+        <p:nvSpPr>
+          <p:cNvPr id="2" name="Symbol zastępczy obrazu slajdu 1"/>
+          <p:cNvSpPr>
+            <a:spLocks noGrp="1" noRot="1" noChangeAspect="1"/>
+          </p:cNvSpPr>
+          <p:nvPr>
+            <p:ph type="sldImg"/>
+          </p:nvPr>
+        </p:nvSpPr>
+        <p:spPr/>
+      </p:sp>
+      <p:sp>
+        <p:nvSpPr>
+          <p:cNvPr id="3" name="Symbol zastępczy notatek 2"/>
+          <p:cNvSpPr>
+            <a:spLocks noGrp="1"/>
+          </p:cNvSpPr>
+          <p:nvPr>
+            <p:ph type="body" idx="1"/>
+          </p:nvPr>
+        </p:nvSpPr>
+        <p:spPr/>
+        <p:txBody>
+          <a:bodyPr/>
+          <a:lstStyle/>
+          <a:p>
+            <a:endParaRPr lang="pl-PL"/>
+          </a:p>
+        </p:txBody>
+      </p:sp>
+      <p:sp>
+        <p:nvSpPr>
+          <p:cNvPr id="4" name="Symbol zastępczy numeru slajdu 3"/>
+          <p:cNvSpPr>
+            <a:spLocks noGrp="1"/>
+          </p:cNvSpPr>
+          <p:nvPr>
+            <p:ph type="sldNum" sz="quarter" idx="5"/>
+          </p:nvPr>
+        </p:nvSpPr>
+        <p:spPr/>
+        <p:txBody>
+          <a:bodyPr/>
+          <a:lstStyle/>
+          <a:p>
+            <a:fld id="{FCA74D20-1EA3-4C23-8DFB-55EEDCA4B4AA}" type="slidenum">
+              <a:rPr lang="pl-PL" smtClean="0"/>
+              <a:t>11</a:t>
+            </a:fld>
+            <a:endParaRPr lang="pl-PL"/>
+          </a:p>
+        </p:txBody>
+      </p:sp>
+    </p:spTree>
+    <p:extLst>
+      <p:ext uri="{BB962C8B-B14F-4D97-AF65-F5344CB8AC3E}">
+        <p14:creationId xmlns:p14="http://schemas.microsoft.com/office/powerpoint/2010/main" val="1223117446"/>
+      </p:ext>
+    </p:extLst>
+  </p:cSld>
+  <p:clrMapOvr>
+    <a:masterClrMapping/>
+  </p:clrMapOvr>
+</p:notes>
+</file>
+
+<file path=ppt/notesSlides/notesSlide12.xml><?xml version="1.0" encoding="utf-8"?>
+<p:notes xmlns:a="http://schemas.openxmlformats.org/drawingml/2006/main" xmlns:r="http://schemas.openxmlformats.org/officeDocument/2006/relationships" xmlns:p="http://schemas.openxmlformats.org/presentationml/2006/main">
+  <p:cSld>
+    <p:spTree>
+      <p:nvGrpSpPr>
+        <p:cNvPr id="1" name=""/>
+        <p:cNvGrpSpPr/>
+        <p:nvPr/>
+      </p:nvGrpSpPr>
+      <p:grpSpPr>
+        <a:xfrm>
+          <a:off x="0" y="0"/>
+          <a:ext cx="0" cy="0"/>
+          <a:chOff x="0" y="0"/>
+          <a:chExt cx="0" cy="0"/>
+        </a:xfrm>
+      </p:grpSpPr>
+      <p:sp>
+        <p:nvSpPr>
+          <p:cNvPr id="2" name="Symbol zastępczy obrazu slajdu 1"/>
+          <p:cNvSpPr>
+            <a:spLocks noGrp="1" noRot="1" noChangeAspect="1"/>
+          </p:cNvSpPr>
+          <p:nvPr>
+            <p:ph type="sldImg"/>
+          </p:nvPr>
+        </p:nvSpPr>
+        <p:spPr/>
+      </p:sp>
+      <p:sp>
+        <p:nvSpPr>
+          <p:cNvPr id="3" name="Symbol zastępczy notatek 2"/>
+          <p:cNvSpPr>
+            <a:spLocks noGrp="1"/>
+          </p:cNvSpPr>
+          <p:nvPr>
+            <p:ph type="body" idx="1"/>
+          </p:nvPr>
+        </p:nvSpPr>
+        <p:spPr/>
+        <p:txBody>
+          <a:bodyPr/>
+          <a:lstStyle/>
+          <a:p>
+            <a:endParaRPr lang="pl-PL"/>
+          </a:p>
+        </p:txBody>
+      </p:sp>
+      <p:sp>
+        <p:nvSpPr>
+          <p:cNvPr id="4" name="Symbol zastępczy numeru slajdu 3"/>
+          <p:cNvSpPr>
+            <a:spLocks noGrp="1"/>
+          </p:cNvSpPr>
+          <p:nvPr>
+            <p:ph type="sldNum" sz="quarter" idx="5"/>
+          </p:nvPr>
+        </p:nvSpPr>
+        <p:spPr/>
+        <p:txBody>
+          <a:bodyPr/>
+          <a:lstStyle/>
+          <a:p>
+            <a:fld id="{FCA74D20-1EA3-4C23-8DFB-55EEDCA4B4AA}" type="slidenum">
+              <a:rPr lang="pl-PL" smtClean="0"/>
+              <a:t>12</a:t>
+            </a:fld>
+            <a:endParaRPr lang="pl-PL"/>
+          </a:p>
+        </p:txBody>
+      </p:sp>
+    </p:spTree>
+    <p:extLst>
+      <p:ext uri="{BB962C8B-B14F-4D97-AF65-F5344CB8AC3E}">
+        <p14:creationId xmlns:p14="http://schemas.microsoft.com/office/powerpoint/2010/main" val="2482869735"/>
+      </p:ext>
+    </p:extLst>
+  </p:cSld>
+  <p:clrMapOvr>
+    <a:masterClrMapping/>
+  </p:clrMapOvr>
+</p:notes>
+</file>
+
+<file path=ppt/notesSlides/notesSlide13.xml><?xml version="1.0" encoding="utf-8"?>
+<p:notes xmlns:a="http://schemas.openxmlformats.org/drawingml/2006/main" xmlns:r="http://schemas.openxmlformats.org/officeDocument/2006/relationships" xmlns:p="http://schemas.openxmlformats.org/presentationml/2006/main">
+  <p:cSld>
+    <p:spTree>
+      <p:nvGrpSpPr>
+        <p:cNvPr id="1" name=""/>
+        <p:cNvGrpSpPr/>
+        <p:nvPr/>
+      </p:nvGrpSpPr>
+      <p:grpSpPr>
+        <a:xfrm>
+          <a:off x="0" y="0"/>
+          <a:ext cx="0" cy="0"/>
+          <a:chOff x="0" y="0"/>
+          <a:chExt cx="0" cy="0"/>
+        </a:xfrm>
+      </p:grpSpPr>
+      <p:sp>
+        <p:nvSpPr>
+          <p:cNvPr id="2" name="Symbol zastępczy obrazu slajdu 1"/>
+          <p:cNvSpPr>
+            <a:spLocks noGrp="1" noRot="1" noChangeAspect="1"/>
+          </p:cNvSpPr>
+          <p:nvPr>
+            <p:ph type="sldImg"/>
+          </p:nvPr>
+        </p:nvSpPr>
+        <p:spPr/>
+      </p:sp>
+      <p:sp>
+        <p:nvSpPr>
+          <p:cNvPr id="3" name="Symbol zastępczy notatek 2"/>
+          <p:cNvSpPr>
+            <a:spLocks noGrp="1"/>
+          </p:cNvSpPr>
+          <p:nvPr>
+            <p:ph type="body" idx="1"/>
+          </p:nvPr>
+        </p:nvSpPr>
+        <p:spPr/>
+        <p:txBody>
+          <a:bodyPr/>
+          <a:lstStyle/>
+          <a:p>
+            <a:endParaRPr lang="pl-PL"/>
+          </a:p>
+        </p:txBody>
+      </p:sp>
+      <p:sp>
+        <p:nvSpPr>
+          <p:cNvPr id="4" name="Symbol zastępczy numeru slajdu 3"/>
+          <p:cNvSpPr>
+            <a:spLocks noGrp="1"/>
+          </p:cNvSpPr>
+          <p:nvPr>
+            <p:ph type="sldNum" sz="quarter" idx="5"/>
+          </p:nvPr>
+        </p:nvSpPr>
+        <p:spPr/>
+        <p:txBody>
+          <a:bodyPr/>
+          <a:lstStyle/>
+          <a:p>
+            <a:fld id="{FCA74D20-1EA3-4C23-8DFB-55EEDCA4B4AA}" type="slidenum">
+              <a:rPr lang="pl-PL" smtClean="0"/>
+              <a:t>13</a:t>
+            </a:fld>
+            <a:endParaRPr lang="pl-PL"/>
+          </a:p>
+        </p:txBody>
+      </p:sp>
+    </p:spTree>
+    <p:extLst>
+      <p:ext uri="{BB962C8B-B14F-4D97-AF65-F5344CB8AC3E}">
+        <p14:creationId xmlns:p14="http://schemas.microsoft.com/office/powerpoint/2010/main" val="578751966"/>
+      </p:ext>
+    </p:extLst>
+  </p:cSld>
+  <p:clrMapOvr>
+    <a:masterClrMapping/>
+  </p:clrMapOvr>
+</p:notes>
+</file>
+
+<file path=ppt/notesSlides/notesSlide14.xml><?xml version="1.0" encoding="utf-8"?>
+<p:notes xmlns:a="http://schemas.openxmlformats.org/drawingml/2006/main" xmlns:r="http://schemas.openxmlformats.org/officeDocument/2006/relationships" xmlns:p="http://schemas.openxmlformats.org/presentationml/2006/main">
+  <p:cSld>
+    <p:spTree>
+      <p:nvGrpSpPr>
+        <p:cNvPr id="1" name=""/>
+        <p:cNvGrpSpPr/>
+        <p:nvPr/>
+      </p:nvGrpSpPr>
+      <p:grpSpPr>
+        <a:xfrm>
+          <a:off x="0" y="0"/>
+          <a:ext cx="0" cy="0"/>
+          <a:chOff x="0" y="0"/>
+          <a:chExt cx="0" cy="0"/>
+        </a:xfrm>
+      </p:grpSpPr>
+      <p:sp>
+        <p:nvSpPr>
+          <p:cNvPr id="2" name="Symbol zastępczy obrazu slajdu 1"/>
+          <p:cNvSpPr>
+            <a:spLocks noGrp="1" noRot="1" noChangeAspect="1"/>
+          </p:cNvSpPr>
+          <p:nvPr>
+            <p:ph type="sldImg"/>
+          </p:nvPr>
+        </p:nvSpPr>
+        <p:spPr/>
+      </p:sp>
+      <p:sp>
+        <p:nvSpPr>
+          <p:cNvPr id="3" name="Symbol zastępczy notatek 2"/>
+          <p:cNvSpPr>
+            <a:spLocks noGrp="1"/>
+          </p:cNvSpPr>
+          <p:nvPr>
+            <p:ph type="body" idx="1"/>
+          </p:nvPr>
+        </p:nvSpPr>
+        <p:spPr/>
+        <p:txBody>
+          <a:bodyPr/>
+          <a:lstStyle/>
+          <a:p>
+            <a:endParaRPr lang="pl-PL"/>
+          </a:p>
+        </p:txBody>
+      </p:sp>
+      <p:sp>
+        <p:nvSpPr>
+          <p:cNvPr id="4" name="Symbol zastępczy numeru slajdu 3"/>
+          <p:cNvSpPr>
+            <a:spLocks noGrp="1"/>
+          </p:cNvSpPr>
+          <p:nvPr>
+            <p:ph type="sldNum" sz="quarter" idx="5"/>
+          </p:nvPr>
+        </p:nvSpPr>
+        <p:spPr/>
+        <p:txBody>
+          <a:bodyPr/>
+          <a:lstStyle/>
+          <a:p>
+            <a:fld id="{FCA74D20-1EA3-4C23-8DFB-55EEDCA4B4AA}" type="slidenum">
+              <a:rPr lang="pl-PL" smtClean="0"/>
+              <a:t>14</a:t>
+            </a:fld>
+            <a:endParaRPr lang="pl-PL"/>
+          </a:p>
+        </p:txBody>
+      </p:sp>
+    </p:spTree>
+    <p:extLst>
+      <p:ext uri="{BB962C8B-B14F-4D97-AF65-F5344CB8AC3E}">
+        <p14:creationId xmlns:p14="http://schemas.microsoft.com/office/powerpoint/2010/main" val="2616826425"/>
+      </p:ext>
+    </p:extLst>
+  </p:cSld>
+  <p:clrMapOvr>
+    <a:masterClrMapping/>
+  </p:clrMapOvr>
+</p:notes>
+</file>
+
+<file path=ppt/notesSlides/notesSlide15.xml><?xml version="1.0" encoding="utf-8"?>
+<p:notes xmlns:a="http://schemas.openxmlformats.org/drawingml/2006/main" xmlns:r="http://schemas.openxmlformats.org/officeDocument/2006/relationships" xmlns:p="http://schemas.openxmlformats.org/presentationml/2006/main">
+  <p:cSld>
+    <p:spTree>
+      <p:nvGrpSpPr>
+        <p:cNvPr id="1" name=""/>
+        <p:cNvGrpSpPr/>
+        <p:nvPr/>
+      </p:nvGrpSpPr>
+      <p:grpSpPr>
+        <a:xfrm>
+          <a:off x="0" y="0"/>
+          <a:ext cx="0" cy="0"/>
+          <a:chOff x="0" y="0"/>
+          <a:chExt cx="0" cy="0"/>
+        </a:xfrm>
+      </p:grpSpPr>
+      <p:sp>
+        <p:nvSpPr>
+          <p:cNvPr id="2" name="Symbol zastępczy obrazu slajdu 1"/>
+          <p:cNvSpPr>
+            <a:spLocks noGrp="1" noRot="1" noChangeAspect="1"/>
+          </p:cNvSpPr>
+          <p:nvPr>
+            <p:ph type="sldImg"/>
+          </p:nvPr>
+        </p:nvSpPr>
+        <p:spPr/>
+      </p:sp>
+      <p:sp>
+        <p:nvSpPr>
+          <p:cNvPr id="3" name="Symbol zastępczy notatek 2"/>
+          <p:cNvSpPr>
+            <a:spLocks noGrp="1"/>
+          </p:cNvSpPr>
+          <p:nvPr>
+            <p:ph type="body" idx="1"/>
+          </p:nvPr>
+        </p:nvSpPr>
+        <p:spPr/>
+        <p:txBody>
+          <a:bodyPr/>
+          <a:lstStyle/>
+          <a:p>
+            <a:endParaRPr lang="pl-PL"/>
+          </a:p>
+        </p:txBody>
+      </p:sp>
+      <p:sp>
+        <p:nvSpPr>
+          <p:cNvPr id="4" name="Symbol zastępczy numeru slajdu 3"/>
+          <p:cNvSpPr>
+            <a:spLocks noGrp="1"/>
+          </p:cNvSpPr>
+          <p:nvPr>
+            <p:ph type="sldNum" sz="quarter" idx="5"/>
+          </p:nvPr>
+        </p:nvSpPr>
+        <p:spPr/>
+        <p:txBody>
+          <a:bodyPr/>
+          <a:lstStyle/>
+          <a:p>
+            <a:fld id="{FCA74D20-1EA3-4C23-8DFB-55EEDCA4B4AA}" type="slidenum">
+              <a:rPr lang="pl-PL" smtClean="0"/>
+              <a:t>15</a:t>
+            </a:fld>
+            <a:endParaRPr lang="pl-PL"/>
+          </a:p>
+        </p:txBody>
+      </p:sp>
+    </p:spTree>
+    <p:extLst>
+      <p:ext uri="{BB962C8B-B14F-4D97-AF65-F5344CB8AC3E}">
+        <p14:creationId xmlns:p14="http://schemas.microsoft.com/office/powerpoint/2010/main" val="92086112"/>
+      </p:ext>
+    </p:extLst>
+  </p:cSld>
+  <p:clrMapOvr>
+    <a:masterClrMapping/>
+  </p:clrMapOvr>
+</p:notes>
+</file>
+
+<file path=ppt/notesSlides/notesSlide16.xml><?xml version="1.0" encoding="utf-8"?>
+<p:notes xmlns:a="http://schemas.openxmlformats.org/drawingml/2006/main" xmlns:r="http://schemas.openxmlformats.org/officeDocument/2006/relationships" xmlns:p="http://schemas.openxmlformats.org/presentationml/2006/main">
+  <p:cSld>
+    <p:spTree>
+      <p:nvGrpSpPr>
+        <p:cNvPr id="1" name=""/>
+        <p:cNvGrpSpPr/>
+        <p:nvPr/>
+      </p:nvGrpSpPr>
+      <p:grpSpPr>
+        <a:xfrm>
+          <a:off x="0" y="0"/>
+          <a:ext cx="0" cy="0"/>
+          <a:chOff x="0" y="0"/>
+          <a:chExt cx="0" cy="0"/>
+        </a:xfrm>
+      </p:grpSpPr>
+      <p:sp>
+        <p:nvSpPr>
+          <p:cNvPr id="2" name="Symbol zastępczy obrazu slajdu 1"/>
+          <p:cNvSpPr>
+            <a:spLocks noGrp="1" noRot="1" noChangeAspect="1"/>
+          </p:cNvSpPr>
+          <p:nvPr>
+            <p:ph type="sldImg"/>
+          </p:nvPr>
+        </p:nvSpPr>
+        <p:spPr/>
+      </p:sp>
+      <p:sp>
+        <p:nvSpPr>
+          <p:cNvPr id="3" name="Symbol zastępczy notatek 2"/>
+          <p:cNvSpPr>
+            <a:spLocks noGrp="1"/>
+          </p:cNvSpPr>
+          <p:nvPr>
+            <p:ph type="body" idx="1"/>
+          </p:nvPr>
+        </p:nvSpPr>
+        <p:spPr/>
+        <p:txBody>
+          <a:bodyPr/>
+          <a:lstStyle/>
+          <a:p>
+            <a:endParaRPr lang="pl-PL"/>
+          </a:p>
+        </p:txBody>
+      </p:sp>
+      <p:sp>
+        <p:nvSpPr>
+          <p:cNvPr id="4" name="Symbol zastępczy numeru slajdu 3"/>
+          <p:cNvSpPr>
+            <a:spLocks noGrp="1"/>
+          </p:cNvSpPr>
+          <p:nvPr>
+            <p:ph type="sldNum" sz="quarter" idx="5"/>
+          </p:nvPr>
+        </p:nvSpPr>
+        <p:spPr/>
+        <p:txBody>
+          <a:bodyPr/>
+          <a:lstStyle/>
+          <a:p>
+            <a:fld id="{FCA74D20-1EA3-4C23-8DFB-55EEDCA4B4AA}" type="slidenum">
+              <a:rPr lang="pl-PL" smtClean="0"/>
+              <a:t>16</a:t>
+            </a:fld>
+            <a:endParaRPr lang="pl-PL"/>
+          </a:p>
+        </p:txBody>
+      </p:sp>
+    </p:spTree>
+    <p:extLst>
+      <p:ext uri="{BB962C8B-B14F-4D97-AF65-F5344CB8AC3E}">
+        <p14:creationId xmlns:p14="http://schemas.microsoft.com/office/powerpoint/2010/main" val="3821901342"/>
+      </p:ext>
+    </p:extLst>
+  </p:cSld>
+  <p:clrMapOvr>
+    <a:masterClrMapping/>
+  </p:clrMapOvr>
+</p:notes>
+</file>
+
+<file path=ppt/notesSlides/notesSlide17.xml><?xml version="1.0" encoding="utf-8"?>
+<p:notes xmlns:a="http://schemas.openxmlformats.org/drawingml/2006/main" xmlns:r="http://schemas.openxmlformats.org/officeDocument/2006/relationships" xmlns:p="http://schemas.openxmlformats.org/presentationml/2006/main">
+  <p:cSld>
+    <p:spTree>
+      <p:nvGrpSpPr>
+        <p:cNvPr id="1" name=""/>
+        <p:cNvGrpSpPr/>
+        <p:nvPr/>
+      </p:nvGrpSpPr>
+      <p:grpSpPr>
+        <a:xfrm>
+          <a:off x="0" y="0"/>
+          <a:ext cx="0" cy="0"/>
+          <a:chOff x="0" y="0"/>
+          <a:chExt cx="0" cy="0"/>
+        </a:xfrm>
+      </p:grpSpPr>
+      <p:sp>
+        <p:nvSpPr>
+          <p:cNvPr id="2" name="Symbol zastępczy obrazu slajdu 1"/>
+          <p:cNvSpPr>
+            <a:spLocks noGrp="1" noRot="1" noChangeAspect="1"/>
+          </p:cNvSpPr>
+          <p:nvPr>
+            <p:ph type="sldImg"/>
+          </p:nvPr>
+        </p:nvSpPr>
+        <p:spPr/>
+      </p:sp>
+      <p:sp>
+        <p:nvSpPr>
+          <p:cNvPr id="3" name="Symbol zastępczy notatek 2"/>
+          <p:cNvSpPr>
+            <a:spLocks noGrp="1"/>
+          </p:cNvSpPr>
+          <p:nvPr>
+            <p:ph type="body" idx="1"/>
+          </p:nvPr>
+        </p:nvSpPr>
+        <p:spPr/>
+        <p:txBody>
+          <a:bodyPr/>
+          <a:lstStyle/>
+          <a:p>
+            <a:endParaRPr lang="pl-PL"/>
+          </a:p>
+        </p:txBody>
+      </p:sp>
+      <p:sp>
+        <p:nvSpPr>
+          <p:cNvPr id="4" name="Symbol zastępczy numeru slajdu 3"/>
+          <p:cNvSpPr>
+            <a:spLocks noGrp="1"/>
+          </p:cNvSpPr>
+          <p:nvPr>
+            <p:ph type="sldNum" sz="quarter" idx="5"/>
+          </p:nvPr>
+        </p:nvSpPr>
+        <p:spPr/>
+        <p:txBody>
+          <a:bodyPr/>
+          <a:lstStyle/>
+          <a:p>
+            <a:fld id="{FCA74D20-1EA3-4C23-8DFB-55EEDCA4B4AA}" type="slidenum">
+              <a:rPr lang="pl-PL" smtClean="0"/>
+              <a:t>17</a:t>
+            </a:fld>
+            <a:endParaRPr lang="pl-PL"/>
+          </a:p>
+        </p:txBody>
+      </p:sp>
+    </p:spTree>
+    <p:extLst>
+      <p:ext uri="{BB962C8B-B14F-4D97-AF65-F5344CB8AC3E}">
+        <p14:creationId xmlns:p14="http://schemas.microsoft.com/office/powerpoint/2010/main" val="3057760836"/>
+      </p:ext>
+    </p:extLst>
+  </p:cSld>
+  <p:clrMapOvr>
+    <a:masterClrMapping/>
+  </p:clrMapOvr>
+</p:notes>
+</file>
+
+<file path=ppt/notesSlides/notesSlide18.xml><?xml version="1.0" encoding="utf-8"?>
+<p:notes xmlns:a="http://schemas.openxmlformats.org/drawingml/2006/main" xmlns:r="http://schemas.openxmlformats.org/officeDocument/2006/relationships" xmlns:p="http://schemas.openxmlformats.org/presentationml/2006/main">
+  <p:cSld>
+    <p:spTree>
+      <p:nvGrpSpPr>
+        <p:cNvPr id="1" name=""/>
+        <p:cNvGrpSpPr/>
+        <p:nvPr/>
+      </p:nvGrpSpPr>
+      <p:grpSpPr>
+        <a:xfrm>
+          <a:off x="0" y="0"/>
+          <a:ext cx="0" cy="0"/>
+          <a:chOff x="0" y="0"/>
+          <a:chExt cx="0" cy="0"/>
+        </a:xfrm>
+      </p:grpSpPr>
+      <p:sp>
+        <p:nvSpPr>
+          <p:cNvPr id="2" name="Symbol zastępczy obrazu slajdu 1"/>
+          <p:cNvSpPr>
+            <a:spLocks noGrp="1" noRot="1" noChangeAspect="1"/>
+          </p:cNvSpPr>
+          <p:nvPr>
+            <p:ph type="sldImg"/>
+          </p:nvPr>
+        </p:nvSpPr>
+        <p:spPr/>
+      </p:sp>
+      <p:sp>
+        <p:nvSpPr>
+          <p:cNvPr id="3" name="Symbol zastępczy notatek 2"/>
+          <p:cNvSpPr>
+            <a:spLocks noGrp="1"/>
+          </p:cNvSpPr>
+          <p:nvPr>
+            <p:ph type="body" idx="1"/>
+          </p:nvPr>
+        </p:nvSpPr>
+        <p:spPr/>
+        <p:txBody>
+          <a:bodyPr/>
+          <a:lstStyle/>
+          <a:p>
+            <a:endParaRPr lang="pl-PL"/>
+          </a:p>
+        </p:txBody>
+      </p:sp>
+      <p:sp>
+        <p:nvSpPr>
+          <p:cNvPr id="4" name="Symbol zastępczy numeru slajdu 3"/>
+          <p:cNvSpPr>
+            <a:spLocks noGrp="1"/>
+          </p:cNvSpPr>
+          <p:nvPr>
+            <p:ph type="sldNum" sz="quarter" idx="5"/>
+          </p:nvPr>
+        </p:nvSpPr>
+        <p:spPr/>
+        <p:txBody>
+          <a:bodyPr/>
+          <a:lstStyle/>
+          <a:p>
+            <a:fld id="{FCA74D20-1EA3-4C23-8DFB-55EEDCA4B4AA}" type="slidenum">
+              <a:rPr lang="pl-PL" smtClean="0"/>
+              <a:t>18</a:t>
+            </a:fld>
+            <a:endParaRPr lang="pl-PL"/>
+          </a:p>
+        </p:txBody>
+      </p:sp>
+    </p:spTree>
+    <p:extLst>
+      <p:ext uri="{BB962C8B-B14F-4D97-AF65-F5344CB8AC3E}">
+        <p14:creationId xmlns:p14="http://schemas.microsoft.com/office/powerpoint/2010/main" val="2144517803"/>
+      </p:ext>
+    </p:extLst>
+  </p:cSld>
+  <p:clrMapOvr>
+    <a:masterClrMapping/>
+  </p:clrMapOvr>
+</p:notes>
+</file>
+
+<file path=ppt/notesSlides/notesSlide19.xml><?xml version="1.0" encoding="utf-8"?>
+<p:notes xmlns:a="http://schemas.openxmlformats.org/drawingml/2006/main" xmlns:r="http://schemas.openxmlformats.org/officeDocument/2006/relationships" xmlns:p="http://schemas.openxmlformats.org/presentationml/2006/main">
+  <p:cSld>
+    <p:spTree>
+      <p:nvGrpSpPr>
+        <p:cNvPr id="1" name=""/>
+        <p:cNvGrpSpPr/>
+        <p:nvPr/>
+      </p:nvGrpSpPr>
+      <p:grpSpPr>
+        <a:xfrm>
+          <a:off x="0" y="0"/>
+          <a:ext cx="0" cy="0"/>
+          <a:chOff x="0" y="0"/>
+          <a:chExt cx="0" cy="0"/>
+        </a:xfrm>
+      </p:grpSpPr>
+      <p:sp>
+        <p:nvSpPr>
+          <p:cNvPr id="2" name="Symbol zastępczy obrazu slajdu 1"/>
+          <p:cNvSpPr>
+            <a:spLocks noGrp="1" noRot="1" noChangeAspect="1"/>
+          </p:cNvSpPr>
+          <p:nvPr>
+            <p:ph type="sldImg"/>
+          </p:nvPr>
+        </p:nvSpPr>
+        <p:spPr/>
+      </p:sp>
+      <p:sp>
+        <p:nvSpPr>
+          <p:cNvPr id="3" name="Symbol zastępczy notatek 2"/>
+          <p:cNvSpPr>
+            <a:spLocks noGrp="1"/>
+          </p:cNvSpPr>
+          <p:nvPr>
+            <p:ph type="body" idx="1"/>
+          </p:nvPr>
+        </p:nvSpPr>
+        <p:spPr/>
+        <p:txBody>
+          <a:bodyPr/>
+          <a:lstStyle/>
+          <a:p>
+            <a:endParaRPr lang="pl-PL"/>
+          </a:p>
+        </p:txBody>
+      </p:sp>
+      <p:sp>
+        <p:nvSpPr>
+          <p:cNvPr id="4" name="Symbol zastępczy numeru slajdu 3"/>
+          <p:cNvSpPr>
+            <a:spLocks noGrp="1"/>
+          </p:cNvSpPr>
+          <p:nvPr>
+            <p:ph type="sldNum" sz="quarter" idx="5"/>
+          </p:nvPr>
+        </p:nvSpPr>
+        <p:spPr/>
+        <p:txBody>
+          <a:bodyPr/>
+          <a:lstStyle/>
+          <a:p>
+            <a:fld id="{FCA74D20-1EA3-4C23-8DFB-55EEDCA4B4AA}" type="slidenum">
+              <a:rPr lang="pl-PL" smtClean="0"/>
+              <a:t>19</a:t>
+            </a:fld>
+            <a:endParaRPr lang="pl-PL"/>
+          </a:p>
+        </p:txBody>
+      </p:sp>
+    </p:spTree>
+    <p:extLst>
+      <p:ext uri="{BB962C8B-B14F-4D97-AF65-F5344CB8AC3E}">
+        <p14:creationId xmlns:p14="http://schemas.microsoft.com/office/powerpoint/2010/main" val="3548773249"/>
+      </p:ext>
+    </p:extLst>
+  </p:cSld>
+  <p:clrMapOvr>
+    <a:masterClrMapping/>
+  </p:clrMapOvr>
+</p:notes>
+</file>
+
+<file path=ppt/notesSlides/notesSlide2.xml><?xml version="1.0" encoding="utf-8"?>
+<p:notes xmlns:a="http://schemas.openxmlformats.org/drawingml/2006/main" xmlns:r="http://schemas.openxmlformats.org/officeDocument/2006/relationships" xmlns:p="http://schemas.openxmlformats.org/presentationml/2006/main">
+  <p:cSld>
+    <p:spTree>
+      <p:nvGrpSpPr>
+        <p:cNvPr id="1" name=""/>
+        <p:cNvGrpSpPr/>
+        <p:nvPr/>
+      </p:nvGrpSpPr>
+      <p:grpSpPr>
+        <a:xfrm>
+          <a:off x="0" y="0"/>
+          <a:ext cx="0" cy="0"/>
+          <a:chOff x="0" y="0"/>
+          <a:chExt cx="0" cy="0"/>
+        </a:xfrm>
+      </p:grpSpPr>
+      <p:sp>
+        <p:nvSpPr>
+          <p:cNvPr id="2" name="Symbol zastępczy obrazu slajdu 1"/>
+          <p:cNvSpPr>
+            <a:spLocks noGrp="1" noRot="1" noChangeAspect="1"/>
+          </p:cNvSpPr>
+          <p:nvPr>
+            <p:ph type="sldImg"/>
+          </p:nvPr>
+        </p:nvSpPr>
+        <p:spPr/>
+      </p:sp>
+      <p:sp>
+        <p:nvSpPr>
+          <p:cNvPr id="3" name="Symbol zastępczy notatek 2"/>
+          <p:cNvSpPr>
+            <a:spLocks noGrp="1"/>
+          </p:cNvSpPr>
+          <p:nvPr>
+            <p:ph type="body" idx="1"/>
+          </p:nvPr>
+        </p:nvSpPr>
+        <p:spPr/>
+        <p:txBody>
+          <a:bodyPr/>
+          <a:lstStyle/>
+          <a:p>
+            <a:endParaRPr lang="pl-PL"/>
+          </a:p>
+        </p:txBody>
+      </p:sp>
+      <p:sp>
+        <p:nvSpPr>
+          <p:cNvPr id="4" name="Symbol zastępczy numeru slajdu 3"/>
+          <p:cNvSpPr>
+            <a:spLocks noGrp="1"/>
+          </p:cNvSpPr>
+          <p:nvPr>
+            <p:ph type="sldNum" sz="quarter" idx="5"/>
+          </p:nvPr>
+        </p:nvSpPr>
+        <p:spPr/>
+        <p:txBody>
+          <a:bodyPr/>
+          <a:lstStyle/>
+          <a:p>
+            <a:fld id="{FCA74D20-1EA3-4C23-8DFB-55EEDCA4B4AA}" type="slidenum">
+              <a:rPr lang="pl-PL" smtClean="0"/>
+              <a:t>2</a:t>
+            </a:fld>
+            <a:endParaRPr lang="pl-PL"/>
+          </a:p>
+        </p:txBody>
+      </p:sp>
+    </p:spTree>
+    <p:extLst>
+      <p:ext uri="{BB962C8B-B14F-4D97-AF65-F5344CB8AC3E}">
+        <p14:creationId xmlns:p14="http://schemas.microsoft.com/office/powerpoint/2010/main" val="1762930541"/>
+      </p:ext>
+    </p:extLst>
+  </p:cSld>
+  <p:clrMapOvr>
+    <a:masterClrMapping/>
+  </p:clrMapOvr>
+</p:notes>
+</file>
+
+<file path=ppt/notesSlides/notesSlide20.xml><?xml version="1.0" encoding="utf-8"?>
+<p:notes xmlns:a="http://schemas.openxmlformats.org/drawingml/2006/main" xmlns:r="http://schemas.openxmlformats.org/officeDocument/2006/relationships" xmlns:p="http://schemas.openxmlformats.org/presentationml/2006/main">
+  <p:cSld>
+    <p:spTree>
+      <p:nvGrpSpPr>
+        <p:cNvPr id="1" name=""/>
+        <p:cNvGrpSpPr/>
+        <p:nvPr/>
+      </p:nvGrpSpPr>
+      <p:grpSpPr>
+        <a:xfrm>
+          <a:off x="0" y="0"/>
+          <a:ext cx="0" cy="0"/>
+          <a:chOff x="0" y="0"/>
+          <a:chExt cx="0" cy="0"/>
+        </a:xfrm>
+      </p:grpSpPr>
+      <p:sp>
+        <p:nvSpPr>
+          <p:cNvPr id="2" name="Symbol zastępczy obrazu slajdu 1"/>
+          <p:cNvSpPr>
+            <a:spLocks noGrp="1" noRot="1" noChangeAspect="1"/>
+          </p:cNvSpPr>
+          <p:nvPr>
+            <p:ph type="sldImg"/>
+          </p:nvPr>
+        </p:nvSpPr>
+        <p:spPr/>
+      </p:sp>
+      <p:sp>
+        <p:nvSpPr>
+          <p:cNvPr id="3" name="Symbol zastępczy notatek 2"/>
+          <p:cNvSpPr>
+            <a:spLocks noGrp="1"/>
+          </p:cNvSpPr>
+          <p:nvPr>
+            <p:ph type="body" idx="1"/>
+          </p:nvPr>
+        </p:nvSpPr>
+        <p:spPr/>
+        <p:txBody>
+          <a:bodyPr/>
+          <a:lstStyle/>
+          <a:p>
+            <a:endParaRPr lang="pl-PL"/>
+          </a:p>
+        </p:txBody>
+      </p:sp>
+      <p:sp>
+        <p:nvSpPr>
+          <p:cNvPr id="4" name="Symbol zastępczy numeru slajdu 3"/>
+          <p:cNvSpPr>
+            <a:spLocks noGrp="1"/>
+          </p:cNvSpPr>
+          <p:nvPr>
+            <p:ph type="sldNum" sz="quarter" idx="5"/>
+          </p:nvPr>
+        </p:nvSpPr>
+        <p:spPr/>
+        <p:txBody>
+          <a:bodyPr/>
+          <a:lstStyle/>
+          <a:p>
+            <a:fld id="{FCA74D20-1EA3-4C23-8DFB-55EEDCA4B4AA}" type="slidenum">
+              <a:rPr lang="pl-PL" smtClean="0"/>
+              <a:t>20</a:t>
+            </a:fld>
+            <a:endParaRPr lang="pl-PL"/>
+          </a:p>
+        </p:txBody>
+      </p:sp>
+    </p:spTree>
+    <p:extLst>
+      <p:ext uri="{BB962C8B-B14F-4D97-AF65-F5344CB8AC3E}">
+        <p14:creationId xmlns:p14="http://schemas.microsoft.com/office/powerpoint/2010/main" val="1726950058"/>
+      </p:ext>
+    </p:extLst>
+  </p:cSld>
+  <p:clrMapOvr>
+    <a:masterClrMapping/>
+  </p:clrMapOvr>
+</p:notes>
+</file>
+
+<file path=ppt/notesSlides/notesSlide21.xml><?xml version="1.0" encoding="utf-8"?>
+<p:notes xmlns:a="http://schemas.openxmlformats.org/drawingml/2006/main" xmlns:r="http://schemas.openxmlformats.org/officeDocument/2006/relationships" xmlns:p="http://schemas.openxmlformats.org/presentationml/2006/main">
+  <p:cSld>
+    <p:spTree>
+      <p:nvGrpSpPr>
+        <p:cNvPr id="1" name=""/>
+        <p:cNvGrpSpPr/>
+        <p:nvPr/>
+      </p:nvGrpSpPr>
+      <p:grpSpPr>
+        <a:xfrm>
+          <a:off x="0" y="0"/>
+          <a:ext cx="0" cy="0"/>
+          <a:chOff x="0" y="0"/>
+          <a:chExt cx="0" cy="0"/>
+        </a:xfrm>
+      </p:grpSpPr>
+      <p:sp>
+        <p:nvSpPr>
+          <p:cNvPr id="2" name="Symbol zastępczy obrazu slajdu 1"/>
+          <p:cNvSpPr>
+            <a:spLocks noGrp="1" noRot="1" noChangeAspect="1"/>
+          </p:cNvSpPr>
+          <p:nvPr>
+            <p:ph type="sldImg"/>
+          </p:nvPr>
+        </p:nvSpPr>
+        <p:spPr/>
+      </p:sp>
+      <p:sp>
+        <p:nvSpPr>
+          <p:cNvPr id="3" name="Symbol zastępczy notatek 2"/>
+          <p:cNvSpPr>
+            <a:spLocks noGrp="1"/>
+          </p:cNvSpPr>
+          <p:nvPr>
+            <p:ph type="body" idx="1"/>
+          </p:nvPr>
+        </p:nvSpPr>
+        <p:spPr/>
+        <p:txBody>
+          <a:bodyPr/>
+          <a:lstStyle/>
+          <a:p>
+            <a:endParaRPr lang="pl-PL"/>
+          </a:p>
+        </p:txBody>
+      </p:sp>
+      <p:sp>
+        <p:nvSpPr>
+          <p:cNvPr id="4" name="Symbol zastępczy numeru slajdu 3"/>
+          <p:cNvSpPr>
+            <a:spLocks noGrp="1"/>
+          </p:cNvSpPr>
+          <p:nvPr>
+            <p:ph type="sldNum" sz="quarter" idx="5"/>
+          </p:nvPr>
+        </p:nvSpPr>
+        <p:spPr/>
+        <p:txBody>
+          <a:bodyPr/>
+          <a:lstStyle/>
+          <a:p>
+            <a:fld id="{FCA74D20-1EA3-4C23-8DFB-55EEDCA4B4AA}" type="slidenum">
+              <a:rPr lang="pl-PL" smtClean="0"/>
+              <a:t>21</a:t>
+            </a:fld>
+            <a:endParaRPr lang="pl-PL"/>
+          </a:p>
+        </p:txBody>
+      </p:sp>
+    </p:spTree>
+    <p:extLst>
+      <p:ext uri="{BB962C8B-B14F-4D97-AF65-F5344CB8AC3E}">
+        <p14:creationId xmlns:p14="http://schemas.microsoft.com/office/powerpoint/2010/main" val="3929512731"/>
+      </p:ext>
+    </p:extLst>
+  </p:cSld>
+  <p:clrMapOvr>
+    <a:masterClrMapping/>
+  </p:clrMapOvr>
+</p:notes>
+</file>
+
+<file path=ppt/notesSlides/notesSlide22.xml><?xml version="1.0" encoding="utf-8"?>
+<p:notes xmlns:a="http://schemas.openxmlformats.org/drawingml/2006/main" xmlns:r="http://schemas.openxmlformats.org/officeDocument/2006/relationships" xmlns:p="http://schemas.openxmlformats.org/presentationml/2006/main">
+  <p:cSld>
+    <p:spTree>
+      <p:nvGrpSpPr>
+        <p:cNvPr id="1" name=""/>
+        <p:cNvGrpSpPr/>
+        <p:nvPr/>
+      </p:nvGrpSpPr>
+      <p:grpSpPr>
+        <a:xfrm>
+          <a:off x="0" y="0"/>
+          <a:ext cx="0" cy="0"/>
+          <a:chOff x="0" y="0"/>
+          <a:chExt cx="0" cy="0"/>
+        </a:xfrm>
+      </p:grpSpPr>
+      <p:sp>
+        <p:nvSpPr>
+          <p:cNvPr id="2" name="Symbol zastępczy obrazu slajdu 1"/>
+          <p:cNvSpPr>
+            <a:spLocks noGrp="1" noRot="1" noChangeAspect="1"/>
+          </p:cNvSpPr>
+          <p:nvPr>
+            <p:ph type="sldImg"/>
+          </p:nvPr>
+        </p:nvSpPr>
+        <p:spPr/>
+      </p:sp>
+      <p:sp>
+        <p:nvSpPr>
+          <p:cNvPr id="3" name="Symbol zastępczy notatek 2"/>
+          <p:cNvSpPr>
+            <a:spLocks noGrp="1"/>
+          </p:cNvSpPr>
+          <p:nvPr>
+            <p:ph type="body" idx="1"/>
+          </p:nvPr>
+        </p:nvSpPr>
+        <p:spPr/>
+        <p:txBody>
+          <a:bodyPr/>
+          <a:lstStyle/>
+          <a:p>
+            <a:endParaRPr lang="pl-PL"/>
+          </a:p>
+        </p:txBody>
+      </p:sp>
+      <p:sp>
+        <p:nvSpPr>
+          <p:cNvPr id="4" name="Symbol zastępczy numeru slajdu 3"/>
+          <p:cNvSpPr>
+            <a:spLocks noGrp="1"/>
+          </p:cNvSpPr>
+          <p:nvPr>
+            <p:ph type="sldNum" sz="quarter" idx="5"/>
+          </p:nvPr>
+        </p:nvSpPr>
+        <p:spPr/>
+        <p:txBody>
+          <a:bodyPr/>
+          <a:lstStyle/>
+          <a:p>
+            <a:fld id="{FCA74D20-1EA3-4C23-8DFB-55EEDCA4B4AA}" type="slidenum">
+              <a:rPr lang="pl-PL" smtClean="0"/>
+              <a:t>22</a:t>
+            </a:fld>
+            <a:endParaRPr lang="pl-PL"/>
+          </a:p>
+        </p:txBody>
+      </p:sp>
+    </p:spTree>
+    <p:extLst>
+      <p:ext uri="{BB962C8B-B14F-4D97-AF65-F5344CB8AC3E}">
+        <p14:creationId xmlns:p14="http://schemas.microsoft.com/office/powerpoint/2010/main" val="47399991"/>
+      </p:ext>
+    </p:extLst>
+  </p:cSld>
+  <p:clrMapOvr>
+    <a:masterClrMapping/>
+  </p:clrMapOvr>
+</p:notes>
+</file>
+
+<file path=ppt/notesSlides/notesSlide23.xml><?xml version="1.0" encoding="utf-8"?>
+<p:notes xmlns:a="http://schemas.openxmlformats.org/drawingml/2006/main" xmlns:r="http://schemas.openxmlformats.org/officeDocument/2006/relationships" xmlns:p="http://schemas.openxmlformats.org/presentationml/2006/main">
+  <p:cSld>
+    <p:spTree>
+      <p:nvGrpSpPr>
+        <p:cNvPr id="1" name=""/>
+        <p:cNvGrpSpPr/>
+        <p:nvPr/>
+      </p:nvGrpSpPr>
+      <p:grpSpPr>
+        <a:xfrm>
+          <a:off x="0" y="0"/>
+          <a:ext cx="0" cy="0"/>
+          <a:chOff x="0" y="0"/>
+          <a:chExt cx="0" cy="0"/>
+        </a:xfrm>
+      </p:grpSpPr>
+      <p:sp>
+        <p:nvSpPr>
+          <p:cNvPr id="2" name="Symbol zastępczy obrazu slajdu 1"/>
+          <p:cNvSpPr>
+            <a:spLocks noGrp="1" noRot="1" noChangeAspect="1"/>
+          </p:cNvSpPr>
+          <p:nvPr>
+            <p:ph type="sldImg"/>
+          </p:nvPr>
+        </p:nvSpPr>
+        <p:spPr/>
+      </p:sp>
+      <p:sp>
+        <p:nvSpPr>
+          <p:cNvPr id="3" name="Symbol zastępczy notatek 2"/>
+          <p:cNvSpPr>
+            <a:spLocks noGrp="1"/>
+          </p:cNvSpPr>
+          <p:nvPr>
+            <p:ph type="body" idx="1"/>
+          </p:nvPr>
+        </p:nvSpPr>
+        <p:spPr/>
+        <p:txBody>
+          <a:bodyPr/>
+          <a:lstStyle/>
+          <a:p>
+            <a:endParaRPr lang="pl-PL"/>
+          </a:p>
+        </p:txBody>
+      </p:sp>
+      <p:sp>
+        <p:nvSpPr>
+          <p:cNvPr id="4" name="Symbol zastępczy numeru slajdu 3"/>
+          <p:cNvSpPr>
+            <a:spLocks noGrp="1"/>
+          </p:cNvSpPr>
+          <p:nvPr>
+            <p:ph type="sldNum" sz="quarter" idx="5"/>
+          </p:nvPr>
+        </p:nvSpPr>
+        <p:spPr/>
+        <p:txBody>
+          <a:bodyPr/>
+          <a:lstStyle/>
+          <a:p>
+            <a:fld id="{FCA74D20-1EA3-4C23-8DFB-55EEDCA4B4AA}" type="slidenum">
+              <a:rPr lang="pl-PL" smtClean="0"/>
+              <a:t>23</a:t>
+            </a:fld>
+            <a:endParaRPr lang="pl-PL"/>
+          </a:p>
+        </p:txBody>
+      </p:sp>
+    </p:spTree>
+    <p:extLst>
+      <p:ext uri="{BB962C8B-B14F-4D97-AF65-F5344CB8AC3E}">
+        <p14:creationId xmlns:p14="http://schemas.microsoft.com/office/powerpoint/2010/main" val="1650373192"/>
+      </p:ext>
+    </p:extLst>
+  </p:cSld>
+  <p:clrMapOvr>
+    <a:masterClrMapping/>
+  </p:clrMapOvr>
+</p:notes>
+</file>
+
+<file path=ppt/notesSlides/notesSlide24.xml><?xml version="1.0" encoding="utf-8"?>
+<p:notes xmlns:a="http://schemas.openxmlformats.org/drawingml/2006/main" xmlns:r="http://schemas.openxmlformats.org/officeDocument/2006/relationships" xmlns:p="http://schemas.openxmlformats.org/presentationml/2006/main">
+  <p:cSld>
+    <p:spTree>
+      <p:nvGrpSpPr>
+        <p:cNvPr id="1" name=""/>
+        <p:cNvGrpSpPr/>
+        <p:nvPr/>
+      </p:nvGrpSpPr>
+      <p:grpSpPr>
+        <a:xfrm>
+          <a:off x="0" y="0"/>
+          <a:ext cx="0" cy="0"/>
+          <a:chOff x="0" y="0"/>
+          <a:chExt cx="0" cy="0"/>
+        </a:xfrm>
+      </p:grpSpPr>
+      <p:sp>
+        <p:nvSpPr>
+          <p:cNvPr id="2" name="Symbol zastępczy obrazu slajdu 1"/>
+          <p:cNvSpPr>
+            <a:spLocks noGrp="1" noRot="1" noChangeAspect="1"/>
+          </p:cNvSpPr>
+          <p:nvPr>
+            <p:ph type="sldImg"/>
+          </p:nvPr>
+        </p:nvSpPr>
+        <p:spPr/>
+      </p:sp>
+      <p:sp>
+        <p:nvSpPr>
+          <p:cNvPr id="3" name="Symbol zastępczy notatek 2"/>
+          <p:cNvSpPr>
+            <a:spLocks noGrp="1"/>
+          </p:cNvSpPr>
+          <p:nvPr>
+            <p:ph type="body" idx="1"/>
+          </p:nvPr>
+        </p:nvSpPr>
+        <p:spPr/>
+        <p:txBody>
+          <a:bodyPr/>
+          <a:lstStyle/>
+          <a:p>
+            <a:endParaRPr lang="pl-PL"/>
+          </a:p>
+        </p:txBody>
+      </p:sp>
+      <p:sp>
+        <p:nvSpPr>
+          <p:cNvPr id="4" name="Symbol zastępczy numeru slajdu 3"/>
+          <p:cNvSpPr>
+            <a:spLocks noGrp="1"/>
+          </p:cNvSpPr>
+          <p:nvPr>
+            <p:ph type="sldNum" sz="quarter" idx="5"/>
+          </p:nvPr>
+        </p:nvSpPr>
+        <p:spPr/>
+        <p:txBody>
+          <a:bodyPr/>
+          <a:lstStyle/>
+          <a:p>
+            <a:fld id="{FCA74D20-1EA3-4C23-8DFB-55EEDCA4B4AA}" type="slidenum">
+              <a:rPr lang="pl-PL" smtClean="0"/>
+              <a:t>24</a:t>
+            </a:fld>
+            <a:endParaRPr lang="pl-PL"/>
+          </a:p>
+        </p:txBody>
+      </p:sp>
+    </p:spTree>
+    <p:extLst>
+      <p:ext uri="{BB962C8B-B14F-4D97-AF65-F5344CB8AC3E}">
+        <p14:creationId xmlns:p14="http://schemas.microsoft.com/office/powerpoint/2010/main" val="1271583400"/>
+      </p:ext>
+    </p:extLst>
+  </p:cSld>
+  <p:clrMapOvr>
+    <a:masterClrMapping/>
+  </p:clrMapOvr>
+</p:notes>
+</file>
+
+<file path=ppt/notesSlides/notesSlide25.xml><?xml version="1.0" encoding="utf-8"?>
+<p:notes xmlns:a="http://schemas.openxmlformats.org/drawingml/2006/main" xmlns:r="http://schemas.openxmlformats.org/officeDocument/2006/relationships" xmlns:p="http://schemas.openxmlformats.org/presentationml/2006/main">
+  <p:cSld>
+    <p:spTree>
+      <p:nvGrpSpPr>
+        <p:cNvPr id="1" name=""/>
+        <p:cNvGrpSpPr/>
+        <p:nvPr/>
+      </p:nvGrpSpPr>
+      <p:grpSpPr>
+        <a:xfrm>
+          <a:off x="0" y="0"/>
+          <a:ext cx="0" cy="0"/>
+          <a:chOff x="0" y="0"/>
+          <a:chExt cx="0" cy="0"/>
+        </a:xfrm>
+      </p:grpSpPr>
+      <p:sp>
+        <p:nvSpPr>
+          <p:cNvPr id="2" name="Symbol zastępczy obrazu slajdu 1"/>
+          <p:cNvSpPr>
+            <a:spLocks noGrp="1" noRot="1" noChangeAspect="1"/>
+          </p:cNvSpPr>
+          <p:nvPr>
+            <p:ph type="sldImg"/>
+          </p:nvPr>
+        </p:nvSpPr>
+        <p:spPr/>
+      </p:sp>
+      <p:sp>
+        <p:nvSpPr>
+          <p:cNvPr id="3" name="Symbol zastępczy notatek 2"/>
+          <p:cNvSpPr>
+            <a:spLocks noGrp="1"/>
+          </p:cNvSpPr>
+          <p:nvPr>
+            <p:ph type="body" idx="1"/>
+          </p:nvPr>
+        </p:nvSpPr>
+        <p:spPr/>
+        <p:txBody>
+          <a:bodyPr/>
+          <a:lstStyle/>
+          <a:p>
+            <a:endParaRPr lang="pl-PL"/>
+          </a:p>
+        </p:txBody>
+      </p:sp>
+      <p:sp>
+        <p:nvSpPr>
+          <p:cNvPr id="4" name="Symbol zastępczy numeru slajdu 3"/>
+          <p:cNvSpPr>
+            <a:spLocks noGrp="1"/>
+          </p:cNvSpPr>
+          <p:nvPr>
+            <p:ph type="sldNum" sz="quarter" idx="5"/>
+          </p:nvPr>
+        </p:nvSpPr>
+        <p:spPr/>
+        <p:txBody>
+          <a:bodyPr/>
+          <a:lstStyle/>
+          <a:p>
+            <a:fld id="{FCA74D20-1EA3-4C23-8DFB-55EEDCA4B4AA}" type="slidenum">
+              <a:rPr lang="pl-PL" smtClean="0"/>
+              <a:t>25</a:t>
+            </a:fld>
+            <a:endParaRPr lang="pl-PL"/>
+          </a:p>
+        </p:txBody>
+      </p:sp>
+    </p:spTree>
+    <p:extLst>
+      <p:ext uri="{BB962C8B-B14F-4D97-AF65-F5344CB8AC3E}">
+        <p14:creationId xmlns:p14="http://schemas.microsoft.com/office/powerpoint/2010/main" val="2706767318"/>
+      </p:ext>
+    </p:extLst>
+  </p:cSld>
+  <p:clrMapOvr>
+    <a:masterClrMapping/>
+  </p:clrMapOvr>
+</p:notes>
+</file>
+
+<file path=ppt/notesSlides/notesSlide26.xml><?xml version="1.0" encoding="utf-8"?>
+<p:notes xmlns:a="http://schemas.openxmlformats.org/drawingml/2006/main" xmlns:r="http://schemas.openxmlformats.org/officeDocument/2006/relationships" xmlns:p="http://schemas.openxmlformats.org/presentationml/2006/main">
+  <p:cSld>
+    <p:spTree>
+      <p:nvGrpSpPr>
+        <p:cNvPr id="1" name=""/>
+        <p:cNvGrpSpPr/>
+        <p:nvPr/>
+      </p:nvGrpSpPr>
+      <p:grpSpPr>
+        <a:xfrm>
+          <a:off x="0" y="0"/>
+          <a:ext cx="0" cy="0"/>
+          <a:chOff x="0" y="0"/>
+          <a:chExt cx="0" cy="0"/>
+        </a:xfrm>
+      </p:grpSpPr>
+      <p:sp>
+        <p:nvSpPr>
+          <p:cNvPr id="2" name="Symbol zastępczy obrazu slajdu 1"/>
+          <p:cNvSpPr>
+            <a:spLocks noGrp="1" noRot="1" noChangeAspect="1"/>
+          </p:cNvSpPr>
+          <p:nvPr>
+            <p:ph type="sldImg"/>
+          </p:nvPr>
+        </p:nvSpPr>
+        <p:spPr/>
+      </p:sp>
+      <p:sp>
+        <p:nvSpPr>
+          <p:cNvPr id="3" name="Symbol zastępczy notatek 2"/>
+          <p:cNvSpPr>
+            <a:spLocks noGrp="1"/>
+          </p:cNvSpPr>
+          <p:nvPr>
+            <p:ph type="body" idx="1"/>
+          </p:nvPr>
+        </p:nvSpPr>
+        <p:spPr/>
+        <p:txBody>
+          <a:bodyPr/>
+          <a:lstStyle/>
+          <a:p>
+            <a:endParaRPr lang="pl-PL"/>
+          </a:p>
+        </p:txBody>
+      </p:sp>
+      <p:sp>
+        <p:nvSpPr>
+          <p:cNvPr id="4" name="Symbol zastępczy numeru slajdu 3"/>
+          <p:cNvSpPr>
+            <a:spLocks noGrp="1"/>
+          </p:cNvSpPr>
+          <p:nvPr>
+            <p:ph type="sldNum" sz="quarter" idx="5"/>
+          </p:nvPr>
+        </p:nvSpPr>
+        <p:spPr/>
+        <p:txBody>
+          <a:bodyPr/>
+          <a:lstStyle/>
+          <a:p>
+            <a:fld id="{FCA74D20-1EA3-4C23-8DFB-55EEDCA4B4AA}" type="slidenum">
+              <a:rPr lang="pl-PL" smtClean="0"/>
+              <a:t>26</a:t>
+            </a:fld>
+            <a:endParaRPr lang="pl-PL"/>
+          </a:p>
+        </p:txBody>
+      </p:sp>
+    </p:spTree>
+    <p:extLst>
+      <p:ext uri="{BB962C8B-B14F-4D97-AF65-F5344CB8AC3E}">
+        <p14:creationId xmlns:p14="http://schemas.microsoft.com/office/powerpoint/2010/main" val="3455061727"/>
+      </p:ext>
+    </p:extLst>
+  </p:cSld>
+  <p:clrMapOvr>
+    <a:masterClrMapping/>
+  </p:clrMapOvr>
+</p:notes>
+</file>
+
+<file path=ppt/notesSlides/notesSlide3.xml><?xml version="1.0" encoding="utf-8"?>
+<p:notes xmlns:a="http://schemas.openxmlformats.org/drawingml/2006/main" xmlns:r="http://schemas.openxmlformats.org/officeDocument/2006/relationships" xmlns:p="http://schemas.openxmlformats.org/presentationml/2006/main">
+  <p:cSld>
+    <p:spTree>
+      <p:nvGrpSpPr>
+        <p:cNvPr id="1" name=""/>
+        <p:cNvGrpSpPr/>
+        <p:nvPr/>
+      </p:nvGrpSpPr>
+      <p:grpSpPr>
+        <a:xfrm>
+          <a:off x="0" y="0"/>
+          <a:ext cx="0" cy="0"/>
+          <a:chOff x="0" y="0"/>
+          <a:chExt cx="0" cy="0"/>
+        </a:xfrm>
+      </p:grpSpPr>
+      <p:sp>
+        <p:nvSpPr>
+          <p:cNvPr id="2" name="Symbol zastępczy obrazu slajdu 1"/>
+          <p:cNvSpPr>
+            <a:spLocks noGrp="1" noRot="1" noChangeAspect="1"/>
+          </p:cNvSpPr>
+          <p:nvPr>
+            <p:ph type="sldImg"/>
+          </p:nvPr>
+        </p:nvSpPr>
+        <p:spPr/>
+      </p:sp>
+      <p:sp>
+        <p:nvSpPr>
+          <p:cNvPr id="3" name="Symbol zastępczy notatek 2"/>
+          <p:cNvSpPr>
+            <a:spLocks noGrp="1"/>
+          </p:cNvSpPr>
+          <p:nvPr>
+            <p:ph type="body" idx="1"/>
+          </p:nvPr>
+        </p:nvSpPr>
+        <p:spPr/>
+        <p:txBody>
+          <a:bodyPr/>
+          <a:lstStyle/>
+          <a:p>
+            <a:endParaRPr lang="pl-PL"/>
+          </a:p>
+        </p:txBody>
+      </p:sp>
+      <p:sp>
+        <p:nvSpPr>
+          <p:cNvPr id="4" name="Symbol zastępczy numeru slajdu 3"/>
+          <p:cNvSpPr>
+            <a:spLocks noGrp="1"/>
+          </p:cNvSpPr>
+          <p:nvPr>
+            <p:ph type="sldNum" sz="quarter" idx="5"/>
+          </p:nvPr>
+        </p:nvSpPr>
+        <p:spPr/>
+        <p:txBody>
+          <a:bodyPr/>
+          <a:lstStyle/>
+          <a:p>
+            <a:fld id="{FCA74D20-1EA3-4C23-8DFB-55EEDCA4B4AA}" type="slidenum">
+              <a:rPr lang="pl-PL" smtClean="0"/>
+              <a:t>3</a:t>
+            </a:fld>
+            <a:endParaRPr lang="pl-PL"/>
+          </a:p>
+        </p:txBody>
+      </p:sp>
+    </p:spTree>
+    <p:extLst>
+      <p:ext uri="{BB962C8B-B14F-4D97-AF65-F5344CB8AC3E}">
+        <p14:creationId xmlns:p14="http://schemas.microsoft.com/office/powerpoint/2010/main" val="2173994955"/>
+      </p:ext>
+    </p:extLst>
+  </p:cSld>
+  <p:clrMapOvr>
+    <a:masterClrMapping/>
+  </p:clrMapOvr>
+</p:notes>
+</file>
+
+<file path=ppt/notesSlides/notesSlide4.xml><?xml version="1.0" encoding="utf-8"?>
+<p:notes xmlns:a="http://schemas.openxmlformats.org/drawingml/2006/main" xmlns:r="http://schemas.openxmlformats.org/officeDocument/2006/relationships" xmlns:p="http://schemas.openxmlformats.org/presentationml/2006/main">
+  <p:cSld>
+    <p:spTree>
+      <p:nvGrpSpPr>
+        <p:cNvPr id="1" name=""/>
+        <p:cNvGrpSpPr/>
+        <p:nvPr/>
+      </p:nvGrpSpPr>
+      <p:grpSpPr>
+        <a:xfrm>
+          <a:off x="0" y="0"/>
+          <a:ext cx="0" cy="0"/>
+          <a:chOff x="0" y="0"/>
+          <a:chExt cx="0" cy="0"/>
+        </a:xfrm>
+      </p:grpSpPr>
+      <p:sp>
+        <p:nvSpPr>
+          <p:cNvPr id="2" name="Symbol zastępczy obrazu slajdu 1"/>
+          <p:cNvSpPr>
+            <a:spLocks noGrp="1" noRot="1" noChangeAspect="1"/>
+          </p:cNvSpPr>
+          <p:nvPr>
+            <p:ph type="sldImg"/>
+          </p:nvPr>
+        </p:nvSpPr>
+        <p:spPr/>
+      </p:sp>
+      <p:sp>
+        <p:nvSpPr>
+          <p:cNvPr id="3" name="Symbol zastępczy notatek 2"/>
+          <p:cNvSpPr>
+            <a:spLocks noGrp="1"/>
+          </p:cNvSpPr>
+          <p:nvPr>
+            <p:ph type="body" idx="1"/>
+          </p:nvPr>
+        </p:nvSpPr>
+        <p:spPr/>
+        <p:txBody>
+          <a:bodyPr/>
+          <a:lstStyle/>
+          <a:p>
+            <a:endParaRPr lang="pl-PL"/>
+          </a:p>
+        </p:txBody>
+      </p:sp>
+      <p:sp>
+        <p:nvSpPr>
+          <p:cNvPr id="4" name="Symbol zastępczy numeru slajdu 3"/>
+          <p:cNvSpPr>
+            <a:spLocks noGrp="1"/>
+          </p:cNvSpPr>
+          <p:nvPr>
+            <p:ph type="sldNum" sz="quarter" idx="5"/>
+          </p:nvPr>
+        </p:nvSpPr>
+        <p:spPr/>
+        <p:txBody>
+          <a:bodyPr/>
+          <a:lstStyle/>
+          <a:p>
+            <a:fld id="{FCA74D20-1EA3-4C23-8DFB-55EEDCA4B4AA}" type="slidenum">
+              <a:rPr lang="pl-PL" smtClean="0"/>
+              <a:t>4</a:t>
+            </a:fld>
+            <a:endParaRPr lang="pl-PL"/>
+          </a:p>
+        </p:txBody>
+      </p:sp>
+    </p:spTree>
+    <p:extLst>
+      <p:ext uri="{BB962C8B-B14F-4D97-AF65-F5344CB8AC3E}">
+        <p14:creationId xmlns:p14="http://schemas.microsoft.com/office/powerpoint/2010/main" val="467231213"/>
+      </p:ext>
+    </p:extLst>
+  </p:cSld>
+  <p:clrMapOvr>
+    <a:masterClrMapping/>
+  </p:clrMapOvr>
+</p:notes>
+</file>
+
+<file path=ppt/notesSlides/notesSlide5.xml><?xml version="1.0" encoding="utf-8"?>
+<p:notes xmlns:a="http://schemas.openxmlformats.org/drawingml/2006/main" xmlns:r="http://schemas.openxmlformats.org/officeDocument/2006/relationships" xmlns:p="http://schemas.openxmlformats.org/presentationml/2006/main">
+  <p:cSld>
+    <p:spTree>
+      <p:nvGrpSpPr>
+        <p:cNvPr id="1" name=""/>
+        <p:cNvGrpSpPr/>
+        <p:nvPr/>
+      </p:nvGrpSpPr>
+      <p:grpSpPr>
+        <a:xfrm>
+          <a:off x="0" y="0"/>
+          <a:ext cx="0" cy="0"/>
+          <a:chOff x="0" y="0"/>
+          <a:chExt cx="0" cy="0"/>
+        </a:xfrm>
+      </p:grpSpPr>
+      <p:sp>
+        <p:nvSpPr>
+          <p:cNvPr id="2" name="Symbol zastępczy obrazu slajdu 1"/>
+          <p:cNvSpPr>
+            <a:spLocks noGrp="1" noRot="1" noChangeAspect="1"/>
+          </p:cNvSpPr>
+          <p:nvPr>
+            <p:ph type="sldImg"/>
+          </p:nvPr>
+        </p:nvSpPr>
+        <p:spPr/>
+      </p:sp>
+      <p:sp>
+        <p:nvSpPr>
+          <p:cNvPr id="3" name="Symbol zastępczy notatek 2"/>
+          <p:cNvSpPr>
+            <a:spLocks noGrp="1"/>
+          </p:cNvSpPr>
+          <p:nvPr>
+            <p:ph type="body" idx="1"/>
+          </p:nvPr>
+        </p:nvSpPr>
+        <p:spPr/>
+        <p:txBody>
+          <a:bodyPr/>
+          <a:lstStyle/>
+          <a:p>
+            <a:endParaRPr lang="pl-PL"/>
+          </a:p>
+        </p:txBody>
+      </p:sp>
+      <p:sp>
+        <p:nvSpPr>
+          <p:cNvPr id="4" name="Symbol zastępczy numeru slajdu 3"/>
+          <p:cNvSpPr>
+            <a:spLocks noGrp="1"/>
+          </p:cNvSpPr>
+          <p:nvPr>
+            <p:ph type="sldNum" sz="quarter" idx="5"/>
+          </p:nvPr>
+        </p:nvSpPr>
+        <p:spPr/>
+        <p:txBody>
+          <a:bodyPr/>
+          <a:lstStyle/>
+          <a:p>
+            <a:fld id="{FCA74D20-1EA3-4C23-8DFB-55EEDCA4B4AA}" type="slidenum">
+              <a:rPr lang="pl-PL" smtClean="0"/>
+              <a:t>5</a:t>
+            </a:fld>
+            <a:endParaRPr lang="pl-PL"/>
+          </a:p>
+        </p:txBody>
+      </p:sp>
+    </p:spTree>
+    <p:extLst>
+      <p:ext uri="{BB962C8B-B14F-4D97-AF65-F5344CB8AC3E}">
+        <p14:creationId xmlns:p14="http://schemas.microsoft.com/office/powerpoint/2010/main" val="2697025526"/>
+      </p:ext>
+    </p:extLst>
+  </p:cSld>
+  <p:clrMapOvr>
+    <a:masterClrMapping/>
+  </p:clrMapOvr>
+</p:notes>
+</file>
+
+<file path=ppt/notesSlides/notesSlide6.xml><?xml version="1.0" encoding="utf-8"?>
+<p:notes xmlns:a="http://schemas.openxmlformats.org/drawingml/2006/main" xmlns:r="http://schemas.openxmlformats.org/officeDocument/2006/relationships" xmlns:p="http://schemas.openxmlformats.org/presentationml/2006/main">
+  <p:cSld>
+    <p:spTree>
+      <p:nvGrpSpPr>
+        <p:cNvPr id="1" name=""/>
+        <p:cNvGrpSpPr/>
+        <p:nvPr/>
+      </p:nvGrpSpPr>
+      <p:grpSpPr>
+        <a:xfrm>
+          <a:off x="0" y="0"/>
+          <a:ext cx="0" cy="0"/>
+          <a:chOff x="0" y="0"/>
+          <a:chExt cx="0" cy="0"/>
+        </a:xfrm>
+      </p:grpSpPr>
+      <p:sp>
+        <p:nvSpPr>
+          <p:cNvPr id="2" name="Symbol zastępczy obrazu slajdu 1"/>
+          <p:cNvSpPr>
+            <a:spLocks noGrp="1" noRot="1" noChangeAspect="1"/>
+          </p:cNvSpPr>
+          <p:nvPr>
+            <p:ph type="sldImg"/>
+          </p:nvPr>
+        </p:nvSpPr>
+        <p:spPr/>
+      </p:sp>
+      <p:sp>
+        <p:nvSpPr>
+          <p:cNvPr id="3" name="Symbol zastępczy notatek 2"/>
+          <p:cNvSpPr>
+            <a:spLocks noGrp="1"/>
+          </p:cNvSpPr>
+          <p:nvPr>
+            <p:ph type="body" idx="1"/>
+          </p:nvPr>
+        </p:nvSpPr>
+        <p:spPr/>
+        <p:txBody>
+          <a:bodyPr/>
+          <a:lstStyle/>
+          <a:p>
+            <a:endParaRPr lang="pl-PL"/>
+          </a:p>
+        </p:txBody>
+      </p:sp>
+      <p:sp>
+        <p:nvSpPr>
+          <p:cNvPr id="4" name="Symbol zastępczy numeru slajdu 3"/>
+          <p:cNvSpPr>
+            <a:spLocks noGrp="1"/>
+          </p:cNvSpPr>
+          <p:nvPr>
+            <p:ph type="sldNum" sz="quarter" idx="5"/>
+          </p:nvPr>
+        </p:nvSpPr>
+        <p:spPr/>
+        <p:txBody>
+          <a:bodyPr/>
+          <a:lstStyle/>
+          <a:p>
+            <a:fld id="{FCA74D20-1EA3-4C23-8DFB-55EEDCA4B4AA}" type="slidenum">
+              <a:rPr lang="pl-PL" smtClean="0"/>
+              <a:t>6</a:t>
+            </a:fld>
+            <a:endParaRPr lang="pl-PL"/>
+          </a:p>
+        </p:txBody>
+      </p:sp>
+    </p:spTree>
+    <p:extLst>
+      <p:ext uri="{BB962C8B-B14F-4D97-AF65-F5344CB8AC3E}">
+        <p14:creationId xmlns:p14="http://schemas.microsoft.com/office/powerpoint/2010/main" val="2618624079"/>
+      </p:ext>
+    </p:extLst>
+  </p:cSld>
+  <p:clrMapOvr>
+    <a:masterClrMapping/>
+  </p:clrMapOvr>
+</p:notes>
+</file>
+
+<file path=ppt/notesSlides/notesSlide7.xml><?xml version="1.0" encoding="utf-8"?>
+<p:notes xmlns:a="http://schemas.openxmlformats.org/drawingml/2006/main" xmlns:r="http://schemas.openxmlformats.org/officeDocument/2006/relationships" xmlns:p="http://schemas.openxmlformats.org/presentationml/2006/main">
+  <p:cSld>
+    <p:spTree>
+      <p:nvGrpSpPr>
+        <p:cNvPr id="1" name=""/>
+        <p:cNvGrpSpPr/>
+        <p:nvPr/>
+      </p:nvGrpSpPr>
+      <p:grpSpPr>
+        <a:xfrm>
+          <a:off x="0" y="0"/>
+          <a:ext cx="0" cy="0"/>
+          <a:chOff x="0" y="0"/>
+          <a:chExt cx="0" cy="0"/>
+        </a:xfrm>
+      </p:grpSpPr>
+      <p:sp>
+        <p:nvSpPr>
+          <p:cNvPr id="2" name="Symbol zastępczy obrazu slajdu 1"/>
+          <p:cNvSpPr>
+            <a:spLocks noGrp="1" noRot="1" noChangeAspect="1"/>
+          </p:cNvSpPr>
+          <p:nvPr>
+            <p:ph type="sldImg"/>
+          </p:nvPr>
+        </p:nvSpPr>
+        <p:spPr/>
+      </p:sp>
+      <p:sp>
+        <p:nvSpPr>
+          <p:cNvPr id="3" name="Symbol zastępczy notatek 2"/>
+          <p:cNvSpPr>
+            <a:spLocks noGrp="1"/>
+          </p:cNvSpPr>
+          <p:nvPr>
+            <p:ph type="body" idx="1"/>
+          </p:nvPr>
+        </p:nvSpPr>
+        <p:spPr/>
+        <p:txBody>
+          <a:bodyPr/>
+          <a:lstStyle/>
+          <a:p>
+            <a:endParaRPr lang="pl-PL"/>
+          </a:p>
+        </p:txBody>
+      </p:sp>
+      <p:sp>
+        <p:nvSpPr>
+          <p:cNvPr id="4" name="Symbol zastępczy numeru slajdu 3"/>
+          <p:cNvSpPr>
+            <a:spLocks noGrp="1"/>
+          </p:cNvSpPr>
+          <p:nvPr>
+            <p:ph type="sldNum" sz="quarter" idx="5"/>
+          </p:nvPr>
+        </p:nvSpPr>
+        <p:spPr/>
+        <p:txBody>
+          <a:bodyPr/>
+          <a:lstStyle/>
+          <a:p>
+            <a:fld id="{FCA74D20-1EA3-4C23-8DFB-55EEDCA4B4AA}" type="slidenum">
+              <a:rPr lang="pl-PL" smtClean="0"/>
+              <a:t>7</a:t>
+            </a:fld>
+            <a:endParaRPr lang="pl-PL"/>
+          </a:p>
+        </p:txBody>
+      </p:sp>
+    </p:spTree>
+    <p:extLst>
+      <p:ext uri="{BB962C8B-B14F-4D97-AF65-F5344CB8AC3E}">
+        <p14:creationId xmlns:p14="http://schemas.microsoft.com/office/powerpoint/2010/main" val="4133876724"/>
+      </p:ext>
+    </p:extLst>
+  </p:cSld>
+  <p:clrMapOvr>
+    <a:masterClrMapping/>
+  </p:clrMapOvr>
+</p:notes>
+</file>
+
+<file path=ppt/notesSlides/notesSlide8.xml><?xml version="1.0" encoding="utf-8"?>
+<p:notes xmlns:a="http://schemas.openxmlformats.org/drawingml/2006/main" xmlns:r="http://schemas.openxmlformats.org/officeDocument/2006/relationships" xmlns:p="http://schemas.openxmlformats.org/presentationml/2006/main">
+  <p:cSld>
+    <p:spTree>
+      <p:nvGrpSpPr>
+        <p:cNvPr id="1" name=""/>
+        <p:cNvGrpSpPr/>
+        <p:nvPr/>
+      </p:nvGrpSpPr>
+      <p:grpSpPr>
+        <a:xfrm>
+          <a:off x="0" y="0"/>
+          <a:ext cx="0" cy="0"/>
+          <a:chOff x="0" y="0"/>
+          <a:chExt cx="0" cy="0"/>
+        </a:xfrm>
+      </p:grpSpPr>
+      <p:sp>
+        <p:nvSpPr>
+          <p:cNvPr id="2" name="Symbol zastępczy obrazu slajdu 1"/>
+          <p:cNvSpPr>
+            <a:spLocks noGrp="1" noRot="1" noChangeAspect="1"/>
+          </p:cNvSpPr>
+          <p:nvPr>
+            <p:ph type="sldImg"/>
+          </p:nvPr>
+        </p:nvSpPr>
+        <p:spPr/>
+      </p:sp>
+      <p:sp>
+        <p:nvSpPr>
+          <p:cNvPr id="3" name="Symbol zastępczy notatek 2"/>
+          <p:cNvSpPr>
+            <a:spLocks noGrp="1"/>
+          </p:cNvSpPr>
+          <p:nvPr>
+            <p:ph type="body" idx="1"/>
+          </p:nvPr>
+        </p:nvSpPr>
+        <p:spPr/>
+        <p:txBody>
+          <a:bodyPr/>
+          <a:lstStyle/>
+          <a:p>
+            <a:endParaRPr lang="pl-PL"/>
+          </a:p>
+        </p:txBody>
+      </p:sp>
+      <p:sp>
+        <p:nvSpPr>
+          <p:cNvPr id="4" name="Symbol zastępczy numeru slajdu 3"/>
+          <p:cNvSpPr>
+            <a:spLocks noGrp="1"/>
+          </p:cNvSpPr>
+          <p:nvPr>
+            <p:ph type="sldNum" sz="quarter" idx="5"/>
+          </p:nvPr>
+        </p:nvSpPr>
+        <p:spPr/>
+        <p:txBody>
+          <a:bodyPr/>
+          <a:lstStyle/>
+          <a:p>
+            <a:fld id="{FCA74D20-1EA3-4C23-8DFB-55EEDCA4B4AA}" type="slidenum">
+              <a:rPr lang="pl-PL" smtClean="0"/>
+              <a:t>8</a:t>
+            </a:fld>
+            <a:endParaRPr lang="pl-PL"/>
+          </a:p>
+        </p:txBody>
+      </p:sp>
+    </p:spTree>
+    <p:extLst>
+      <p:ext uri="{BB962C8B-B14F-4D97-AF65-F5344CB8AC3E}">
+        <p14:creationId xmlns:p14="http://schemas.microsoft.com/office/powerpoint/2010/main" val="1275034334"/>
+      </p:ext>
+    </p:extLst>
+  </p:cSld>
+  <p:clrMapOvr>
+    <a:masterClrMapping/>
+  </p:clrMapOvr>
+</p:notes>
+</file>
+
+<file path=ppt/notesSlides/notesSlide9.xml><?xml version="1.0" encoding="utf-8"?>
+<p:notes xmlns:a="http://schemas.openxmlformats.org/drawingml/2006/main" xmlns:r="http://schemas.openxmlformats.org/officeDocument/2006/relationships" xmlns:p="http://schemas.openxmlformats.org/presentationml/2006/main">
+  <p:cSld>
+    <p:spTree>
+      <p:nvGrpSpPr>
+        <p:cNvPr id="1" name=""/>
+        <p:cNvGrpSpPr/>
+        <p:nvPr/>
+      </p:nvGrpSpPr>
+      <p:grpSpPr>
+        <a:xfrm>
+          <a:off x="0" y="0"/>
+          <a:ext cx="0" cy="0"/>
+          <a:chOff x="0" y="0"/>
+          <a:chExt cx="0" cy="0"/>
+        </a:xfrm>
+      </p:grpSpPr>
+      <p:sp>
+        <p:nvSpPr>
+          <p:cNvPr id="2" name="Symbol zastępczy obrazu slajdu 1"/>
+          <p:cNvSpPr>
+            <a:spLocks noGrp="1" noRot="1" noChangeAspect="1"/>
+          </p:cNvSpPr>
+          <p:nvPr>
+            <p:ph type="sldImg"/>
+          </p:nvPr>
+        </p:nvSpPr>
+        <p:spPr/>
+      </p:sp>
+      <p:sp>
+        <p:nvSpPr>
+          <p:cNvPr id="3" name="Symbol zastępczy notatek 2"/>
+          <p:cNvSpPr>
+            <a:spLocks noGrp="1"/>
+          </p:cNvSpPr>
+          <p:nvPr>
+            <p:ph type="body" idx="1"/>
+          </p:nvPr>
+        </p:nvSpPr>
+        <p:spPr/>
+        <p:txBody>
+          <a:bodyPr/>
+          <a:lstStyle/>
+          <a:p>
+            <a:endParaRPr lang="pl-PL"/>
+          </a:p>
+        </p:txBody>
+      </p:sp>
+      <p:sp>
+        <p:nvSpPr>
+          <p:cNvPr id="4" name="Symbol zastępczy numeru slajdu 3"/>
+          <p:cNvSpPr>
+            <a:spLocks noGrp="1"/>
+          </p:cNvSpPr>
+          <p:nvPr>
+            <p:ph type="sldNum" sz="quarter" idx="5"/>
+          </p:nvPr>
+        </p:nvSpPr>
+        <p:spPr/>
+        <p:txBody>
+          <a:bodyPr/>
+          <a:lstStyle/>
+          <a:p>
+            <a:fld id="{FCA74D20-1EA3-4C23-8DFB-55EEDCA4B4AA}" type="slidenum">
+              <a:rPr lang="pl-PL" smtClean="0"/>
+              <a:t>9</a:t>
+            </a:fld>
+            <a:endParaRPr lang="pl-PL"/>
+          </a:p>
+        </p:txBody>
+      </p:sp>
+    </p:spTree>
+    <p:extLst>
+      <p:ext uri="{BB962C8B-B14F-4D97-AF65-F5344CB8AC3E}">
+        <p14:creationId xmlns:p14="http://schemas.microsoft.com/office/powerpoint/2010/main" val="3803389539"/>
+      </p:ext>
+    </p:extLst>
+  </p:cSld>
+  <p:clrMapOvr>
+    <a:masterClrMapping/>
+  </p:clrMapOvr>
+</p:notes>
 </file>
 
 <file path=ppt/slideLayouts/slideLayout1.xml><?xml version="1.0" encoding="utf-8"?>
@@ -3112,8 +5648,8 @@
         </p:nvSpPr>
         <p:spPr>
           <a:xfrm>
-            <a:off x="838200" y="1284790"/>
-            <a:ext cx="3621191" cy="4191450"/>
+            <a:off x="838200" y="2812868"/>
+            <a:ext cx="3621191" cy="2621281"/>
           </a:xfrm>
         </p:spPr>
         <p:txBody>
@@ -3124,9 +5660,9 @@
           <a:p>
             <a:pPr algn="r"/>
             <a:r>
-              <a:rPr lang="en-US" sz="4800" b="1" kern="1200" dirty="0" err="1">
+              <a:rPr lang="en-US" sz="4800" b="1" kern="1200">
                 <a:solidFill>
-                  <a:schemeClr val="accent1"/>
+                  <a:srgbClr val="D43F35"/>
                 </a:solidFill>
                 <a:latin typeface="Bahnschrift" panose="020B0502040204020203" pitchFamily="34" charset="0"/>
               </a:rPr>
@@ -3134,7 +5670,7 @@
             </a:r>
             <a:endParaRPr lang="en-US" sz="4800" b="1" kern="1200" dirty="0">
               <a:solidFill>
-                <a:schemeClr val="accent1"/>
+                <a:srgbClr val="D43F35"/>
               </a:solidFill>
               <a:latin typeface="Bahnschrift" panose="020B0502040204020203" pitchFamily="34" charset="0"/>
             </a:endParaRPr>
@@ -3214,7 +5750,7 @@
         </p:nvSpPr>
         <p:spPr>
           <a:xfrm>
-            <a:off x="4976031" y="2442258"/>
+            <a:off x="4796951" y="1904842"/>
             <a:ext cx="6377769" cy="3451864"/>
           </a:xfrm>
         </p:spPr>
@@ -3226,40 +5762,13 @@
           <a:p>
             <a:pPr algn="l"/>
             <a:r>
-              <a:rPr lang="en-US" b="1" dirty="0" err="1">
+              <a:rPr lang="en-US" b="1">
                 <a:solidFill>
                   <a:schemeClr val="tx1"/>
                 </a:solidFill>
                 <a:latin typeface="Bahnschrift" panose="020B0502040204020203" pitchFamily="34" charset="0"/>
               </a:rPr>
-              <a:t>Skład</a:t>
-            </a:r>
-            <a:r>
-              <a:rPr lang="en-US" b="1" dirty="0">
-                <a:solidFill>
-                  <a:schemeClr val="tx1"/>
-                </a:solidFill>
-                <a:latin typeface="Bahnschrift" panose="020B0502040204020203" pitchFamily="34" charset="0"/>
-              </a:rPr>
-              <a:t> </a:t>
-            </a:r>
-            <a:r>
-              <a:rPr lang="en-US" b="1" dirty="0" err="1">
-                <a:solidFill>
-                  <a:schemeClr val="tx1"/>
-                </a:solidFill>
-                <a:latin typeface="Bahnschrift" panose="020B0502040204020203" pitchFamily="34" charset="0"/>
-              </a:rPr>
-              <a:t>zespołu</a:t>
-            </a:r>
-            <a:r>
-              <a:rPr lang="en-US" b="1" dirty="0">
-                <a:solidFill>
-                  <a:schemeClr val="tx1"/>
-                </a:solidFill>
-                <a:latin typeface="Bahnschrift" panose="020B0502040204020203" pitchFamily="34" charset="0"/>
-              </a:rPr>
-              <a:t>:</a:t>
+              <a:t>Skład zespołu:</a:t>
             </a:r>
           </a:p>
           <a:p>
@@ -3268,7 +5777,7 @@
               <a:buChar char="§"/>
             </a:pPr>
             <a:r>
-              <a:rPr lang="en-US" dirty="0">
+              <a:rPr lang="en-US">
                 <a:solidFill>
                   <a:schemeClr val="tx1"/>
                 </a:solidFill>
@@ -3283,7 +5792,7 @@
               <a:buChar char="§"/>
             </a:pPr>
             <a:r>
-              <a:rPr lang="en-US" dirty="0">
+              <a:rPr lang="en-US">
                 <a:solidFill>
                   <a:schemeClr val="tx1"/>
                 </a:solidFill>
@@ -3298,38 +5807,14 @@
               <a:buChar char="§"/>
             </a:pPr>
             <a:r>
-              <a:rPr lang="en-US" dirty="0" err="1">
+              <a:rPr lang="en-US">
                 <a:solidFill>
                   <a:schemeClr val="tx1"/>
                 </a:solidFill>
                 <a:latin typeface="Bahnschrift" panose="020B0502040204020203" pitchFamily="34" charset="0"/>
               </a:rPr>
-              <a:t>Michał</a:t>
-            </a:r>
-            <a:r>
-              <a:rPr lang="en-US" dirty="0">
-                <a:solidFill>
-                  <a:schemeClr val="tx1"/>
-                </a:solidFill>
-                <a:latin typeface="Bahnschrift" panose="020B0502040204020203" pitchFamily="34" charset="0"/>
-              </a:rPr>
-              <a:t> </a:t>
-            </a:r>
-            <a:r>
-              <a:rPr lang="en-US" dirty="0" err="1">
-                <a:solidFill>
-                  <a:schemeClr val="tx1"/>
-                </a:solidFill>
-                <a:latin typeface="Bahnschrift" panose="020B0502040204020203" pitchFamily="34" charset="0"/>
-              </a:rPr>
-              <a:t>Kierzkowski</a:t>
-            </a:r>
-            <a:endParaRPr lang="en-US" dirty="0">
-              <a:solidFill>
-                <a:schemeClr val="tx1"/>
-              </a:solidFill>
-              <a:latin typeface="Bahnschrift" panose="020B0502040204020203" pitchFamily="34" charset="0"/>
-            </a:endParaRPr>
+              <a:t>Michał Kierzkowski</a:t>
+            </a:r>
           </a:p>
           <a:p>
             <a:pPr indent="-228600" algn="l">
@@ -3345,6 +5830,42 @@
           </a:p>
         </p:txBody>
       </p:sp>
+      <p:pic>
+        <p:nvPicPr>
+          <p:cNvPr id="5" name="Obraz 4">
+            <a:extLst>
+              <a:ext uri="{FF2B5EF4-FFF2-40B4-BE49-F238E27FC236}">
+                <a16:creationId xmlns:a16="http://schemas.microsoft.com/office/drawing/2014/main" id="{47DED8FE-977E-4F30-958B-82B64B94B3FD}"/>
+              </a:ext>
+            </a:extLst>
+          </p:cNvPr>
+          <p:cNvPicPr>
+            <a:picLocks noChangeAspect="1"/>
+          </p:cNvPicPr>
+          <p:nvPr/>
+        </p:nvPicPr>
+        <p:blipFill>
+          <a:blip r:embed="rId3">
+            <a:extLst>
+              <a:ext uri="{28A0092B-C50C-407E-A947-70E740481C1C}">
+                <a14:useLocalDpi xmlns:a14="http://schemas.microsoft.com/office/drawing/2010/main" val="0"/>
+              </a:ext>
+            </a:extLst>
+          </a:blip>
+          <a:stretch>
+            <a:fillRect/>
+          </a:stretch>
+        </p:blipFill>
+        <p:spPr>
+          <a:xfrm>
+            <a:off x="1838897" y="1994962"/>
+            <a:ext cx="1635812" cy="1635812"/>
+          </a:xfrm>
+          <a:prstGeom prst="rect">
+            <a:avLst/>
+          </a:prstGeom>
+        </p:spPr>
+      </p:pic>
     </p:spTree>
     <p:extLst>
       <p:ext uri="{BB962C8B-B14F-4D97-AF65-F5344CB8AC3E}">
@@ -3475,7 +5996,7 @@
           <p:nvPr/>
         </p:nvPicPr>
         <p:blipFill rotWithShape="1">
-          <a:blip r:embed="rId2"/>
+          <a:blip r:embed="rId3"/>
           <a:srcRect l="6915" t="6165" r="7312" b="6652"/>
           <a:stretch/>
         </p:blipFill>
@@ -3588,7 +6109,7 @@
           <p:nvPr/>
         </p:nvPicPr>
         <p:blipFill rotWithShape="1">
-          <a:blip r:embed="rId2"/>
+          <a:blip r:embed="rId3"/>
           <a:srcRect l="2234" t="4077" r="2071" b="3804"/>
           <a:stretch/>
         </p:blipFill>
@@ -4033,7 +6554,7 @@
           <p:nvPr/>
         </p:nvPicPr>
         <p:blipFill rotWithShape="1">
-          <a:blip r:embed="rId2"/>
+          <a:blip r:embed="rId3"/>
           <a:srcRect l="2738" t="3113" r="3000" b="3423"/>
           <a:stretch/>
         </p:blipFill>
@@ -4235,7 +6756,7 @@
           <p:nvPr/>
         </p:nvPicPr>
         <p:blipFill rotWithShape="1">
-          <a:blip r:embed="rId2"/>
+          <a:blip r:embed="rId3"/>
           <a:srcRect l="6503" t="9040" r="5831" b="9892"/>
           <a:stretch/>
         </p:blipFill>
@@ -4342,7 +6863,7 @@
           <p:nvPr/>
         </p:nvPicPr>
         <p:blipFill rotWithShape="1">
-          <a:blip r:embed="rId2"/>
+          <a:blip r:embed="rId3"/>
           <a:srcRect l="2456" t="5090" r="2808" b="5061"/>
           <a:stretch/>
         </p:blipFill>
@@ -4449,13 +6970,13 @@
           <p:nvPr/>
         </p:nvPicPr>
         <p:blipFill>
-          <a:blip r:embed="rId2">
+          <a:blip r:embed="rId3">
             <a:extLst>
               <a:ext uri="{28A0092B-C50C-407E-A947-70E740481C1C}">
                 <a14:useLocalDpi xmlns:a14="http://schemas.microsoft.com/office/drawing/2010/main" val="0"/>
               </a:ext>
               <a:ext uri="{96DAC541-7B7A-43D3-8B79-37D633B846F1}">
-                <asvg:svgBlip xmlns:asvg="http://schemas.microsoft.com/office/drawing/2016/SVG/main" r:embed="rId3"/>
+                <asvg:svgBlip xmlns:asvg="http://schemas.microsoft.com/office/drawing/2016/SVG/main" r:embed="rId4"/>
               </a:ext>
             </a:extLst>
           </a:blip>
@@ -4706,7 +7227,7 @@
           <p:nvPr/>
         </p:nvPicPr>
         <p:blipFill rotWithShape="1">
-          <a:blip r:embed="rId2"/>
+          <a:blip r:embed="rId3"/>
           <a:srcRect l="2198" t="3646" r="2108" b="3829"/>
           <a:stretch/>
         </p:blipFill>
@@ -4973,7 +7494,7 @@
           <p:nvPr/>
         </p:nvPicPr>
         <p:blipFill rotWithShape="1">
-          <a:blip r:embed="rId2"/>
+          <a:blip r:embed="rId3"/>
           <a:srcRect l="2398" t="4720" r="2398" b="4753"/>
           <a:stretch/>
         </p:blipFill>
@@ -5372,7 +7893,7 @@
           <p:nvPr/>
         </p:nvPicPr>
         <p:blipFill rotWithShape="1">
-          <a:blip r:embed="rId2"/>
+          <a:blip r:embed="rId3"/>
           <a:srcRect l="2442" t="4022" r="2484" b="3312"/>
           <a:stretch/>
         </p:blipFill>
@@ -5479,7 +8000,7 @@
           <p:nvPr/>
         </p:nvPicPr>
         <p:blipFill rotWithShape="1">
-          <a:blip r:embed="rId2"/>
+          <a:blip r:embed="rId3"/>
           <a:srcRect l="1898" t="4283" r="1979" b="3967"/>
           <a:stretch/>
         </p:blipFill>
@@ -5586,7 +8107,7 @@
           <p:nvPr/>
         </p:nvPicPr>
         <p:blipFill>
-          <a:blip r:embed="rId2">
+          <a:blip r:embed="rId3">
             <a:clrChange>
               <a:clrFrom>
                 <a:srgbClr val="FFFFFF"/>
@@ -5812,7 +8333,7 @@
           <p:nvPr/>
         </p:nvPicPr>
         <p:blipFill>
-          <a:blip r:embed="rId2">
+          <a:blip r:embed="rId3">
             <a:extLst>
               <a:ext uri="{28A0092B-C50C-407E-A947-70E740481C1C}">
                 <a14:useLocalDpi xmlns:a14="http://schemas.microsoft.com/office/drawing/2010/main" val="0"/>
@@ -5934,7 +8455,7 @@
           <p:nvPr/>
         </p:nvPicPr>
         <p:blipFill>
-          <a:blip r:embed="rId2">
+          <a:blip r:embed="rId3">
             <a:extLst>
               <a:ext uri="{28A0092B-C50C-407E-A947-70E740481C1C}">
                 <a14:useLocalDpi xmlns:a14="http://schemas.microsoft.com/office/drawing/2010/main" val="0"/>
@@ -6043,10 +8564,10 @@
       </p:grpSpPr>
       <p:pic>
         <p:nvPicPr>
-          <p:cNvPr id="4" name="Obraz 3" descr="Obraz zawierający zrzut ekranu, niebo, wewnątrz, komputer&#10;&#10;Opis wygenerowany automatycznie">
+          <p:cNvPr id="5" name="Obraz 4" descr="Obraz zawierający zrzut ekranu, niebo, wewnątrz, komputer&#10;&#10;Opis wygenerowany automatycznie">
             <a:extLst>
               <a:ext uri="{FF2B5EF4-FFF2-40B4-BE49-F238E27FC236}">
-                <a16:creationId xmlns:a16="http://schemas.microsoft.com/office/drawing/2014/main" id="{79A8D056-786D-4712-9CB4-1D15A2FA67FF}"/>
+                <a16:creationId xmlns:a16="http://schemas.microsoft.com/office/drawing/2014/main" id="{C4F13207-7E2F-4A27-A884-63889A90A233}"/>
               </a:ext>
             </a:extLst>
           </p:cNvPr>
@@ -6056,7 +8577,7 @@
           <p:nvPr/>
         </p:nvPicPr>
         <p:blipFill>
-          <a:blip r:embed="rId2">
+          <a:blip r:embed="rId3">
             <a:extLst>
               <a:ext uri="{28A0092B-C50C-407E-A947-70E740481C1C}">
                 <a14:useLocalDpi xmlns:a14="http://schemas.microsoft.com/office/drawing/2010/main" val="0"/>
@@ -6174,7 +8695,7 @@
           <p:nvPr/>
         </p:nvPicPr>
         <p:blipFill>
-          <a:blip r:embed="rId2">
+          <a:blip r:embed="rId3">
             <a:extLst>
               <a:ext uri="{28A0092B-C50C-407E-A947-70E740481C1C}">
                 <a14:useLocalDpi xmlns:a14="http://schemas.microsoft.com/office/drawing/2010/main" val="0"/>
@@ -6443,7 +8964,7 @@
           <p:nvPr/>
         </p:nvPicPr>
         <p:blipFill rotWithShape="1">
-          <a:blip r:embed="rId2">
+          <a:blip r:embed="rId3">
             <a:extLst>
               <a:ext uri="{28A0092B-C50C-407E-A947-70E740481C1C}">
                 <a14:useLocalDpi xmlns:a14="http://schemas.microsoft.com/office/drawing/2010/main" val="0"/>
@@ -6478,7 +8999,7 @@
           <p:nvPr/>
         </p:nvPicPr>
         <p:blipFill>
-          <a:blip r:embed="rId3">
+          <a:blip r:embed="rId4">
             <a:extLst>
               <a:ext uri="{28A0092B-C50C-407E-A947-70E740481C1C}">
                 <a14:useLocalDpi xmlns:a14="http://schemas.microsoft.com/office/drawing/2010/main" val="0"/>
@@ -6514,7 +9035,7 @@
           <p:nvPr/>
         </p:nvPicPr>
         <p:blipFill>
-          <a:blip r:embed="rId4">
+          <a:blip r:embed="rId5">
             <a:extLst>
               <a:ext uri="{28A0092B-C50C-407E-A947-70E740481C1C}">
                 <a14:useLocalDpi xmlns:a14="http://schemas.microsoft.com/office/drawing/2010/main" val="0"/>
@@ -6550,7 +9071,7 @@
           <p:nvPr/>
         </p:nvPicPr>
         <p:blipFill>
-          <a:blip r:embed="rId5">
+          <a:blip r:embed="rId6">
             <a:extLst>
               <a:ext uri="{28A0092B-C50C-407E-A947-70E740481C1C}">
                 <a14:useLocalDpi xmlns:a14="http://schemas.microsoft.com/office/drawing/2010/main" val="0"/>
@@ -6670,7 +9191,7 @@
           <p:nvPr/>
         </p:nvPicPr>
         <p:blipFill>
-          <a:blip r:embed="rId2">
+          <a:blip r:embed="rId3">
             <a:extLst>
               <a:ext uri="{28A0092B-C50C-407E-A947-70E740481C1C}">
                 <a14:useLocalDpi xmlns:a14="http://schemas.microsoft.com/office/drawing/2010/main" val="0"/>
@@ -6784,7 +9305,7 @@
           <p:nvPr/>
         </p:nvPicPr>
         <p:blipFill>
-          <a:blip r:embed="rId2">
+          <a:blip r:embed="rId3">
             <a:extLst>
               <a:ext uri="{28A0092B-C50C-407E-A947-70E740481C1C}">
                 <a14:useLocalDpi xmlns:a14="http://schemas.microsoft.com/office/drawing/2010/main" val="0"/>
@@ -6977,7 +9498,7 @@
           <p:nvPr/>
         </p:nvPicPr>
         <p:blipFill rotWithShape="1">
-          <a:blip r:embed="rId2"/>
+          <a:blip r:embed="rId3"/>
           <a:srcRect l="3311" t="5333" r="3302" b="5190"/>
           <a:stretch/>
         </p:blipFill>
@@ -7102,7 +9623,7 @@
           <p:nvPr/>
         </p:nvPicPr>
         <p:blipFill rotWithShape="1">
-          <a:blip r:embed="rId2"/>
+          <a:blip r:embed="rId3"/>
           <a:srcRect l="2550" t="4675" r="2485" b="4166"/>
           <a:stretch/>
         </p:blipFill>
@@ -7572,7 +10093,7 @@
           <p:nvPr/>
         </p:nvPicPr>
         <p:blipFill rotWithShape="1">
-          <a:blip r:embed="rId2"/>
+          <a:blip r:embed="rId3"/>
           <a:srcRect l="4721" t="9834" r="4687" b="9834"/>
           <a:stretch/>
         </p:blipFill>
@@ -7850,4 +10371,299 @@
   <a:objectDefaults/>
   <a:extraClrSchemeLst/>
 </a:theme>
+</file>
+
+<file path=ppt/theme/theme2.xml><?xml version="1.0" encoding="utf-8"?>
+<a:theme xmlns:a="http://schemas.openxmlformats.org/drawingml/2006/main" name="Motyw pakietu Office">
+  <a:themeElements>
+    <a:clrScheme name="Pakiet Office">
+      <a:dk1>
+        <a:sysClr val="windowText" lastClr="000000"/>
+      </a:dk1>
+      <a:lt1>
+        <a:sysClr val="window" lastClr="FFFFFF"/>
+      </a:lt1>
+      <a:dk2>
+        <a:srgbClr val="44546A"/>
+      </a:dk2>
+      <a:lt2>
+        <a:srgbClr val="E7E6E6"/>
+      </a:lt2>
+      <a:accent1>
+        <a:srgbClr val="4472C4"/>
+      </a:accent1>
+      <a:accent2>
+        <a:srgbClr val="ED7D31"/>
+      </a:accent2>
+      <a:accent3>
+        <a:srgbClr val="A5A5A5"/>
+      </a:accent3>
+      <a:accent4>
+        <a:srgbClr val="FFC000"/>
+      </a:accent4>
+      <a:accent5>
+        <a:srgbClr val="5B9BD5"/>
+      </a:accent5>
+      <a:accent6>
+        <a:srgbClr val="70AD47"/>
+      </a:accent6>
+      <a:hlink>
+        <a:srgbClr val="0563C1"/>
+      </a:hlink>
+      <a:folHlink>
+        <a:srgbClr val="954F72"/>
+      </a:folHlink>
+    </a:clrScheme>
+    <a:fontScheme name="Pakiet Office">
+      <a:majorFont>
+        <a:latin typeface="Calibri Light" panose="020F0302020204030204"/>
+        <a:ea typeface=""/>
+        <a:cs typeface=""/>
+        <a:font script="Jpan" typeface="游ゴシック Light"/>
+        <a:font script="Hang" typeface="맑은 고딕"/>
+        <a:font script="Hans" typeface="等线 Light"/>
+        <a:font script="Hant" typeface="新細明體"/>
+        <a:font script="Arab" typeface="Times New Roman"/>
+        <a:font script="Hebr" typeface="Times New Roman"/>
+        <a:font script="Thai" typeface="Angsana New"/>
+        <a:font script="Ethi" typeface="Nyala"/>
+        <a:font script="Beng" typeface="Vrinda"/>
+        <a:font script="Gujr" typeface="Shruti"/>
+        <a:font script="Khmr" typeface="MoolBoran"/>
+        <a:font script="Knda" typeface="Tunga"/>
+        <a:font script="Guru" typeface="Raavi"/>
+        <a:font script="Cans" typeface="Euphemia"/>
+        <a:font script="Cher" typeface="Plantagenet Cherokee"/>
+        <a:font script="Yiii" typeface="Microsoft Yi Baiti"/>
+        <a:font script="Tibt" typeface="Microsoft Himalaya"/>
+        <a:font script="Thaa" typeface="MV Boli"/>
+        <a:font script="Deva" typeface="Mangal"/>
+        <a:font script="Telu" typeface="Gautami"/>
+        <a:font script="Taml" typeface="Latha"/>
+        <a:font script="Syrc" typeface="Estrangelo Edessa"/>
+        <a:font script="Orya" typeface="Kalinga"/>
+        <a:font script="Mlym" typeface="Kartika"/>
+        <a:font script="Laoo" typeface="DokChampa"/>
+        <a:font script="Sinh" typeface="Iskoola Pota"/>
+        <a:font script="Mong" typeface="Mongolian Baiti"/>
+        <a:font script="Viet" typeface="Times New Roman"/>
+        <a:font script="Uigh" typeface="Microsoft Uighur"/>
+        <a:font script="Geor" typeface="Sylfaen"/>
+        <a:font script="Armn" typeface="Arial"/>
+        <a:font script="Bugi" typeface="Leelawadee UI"/>
+        <a:font script="Bopo" typeface="Microsoft JhengHei"/>
+        <a:font script="Java" typeface="Javanese Text"/>
+        <a:font script="Lisu" typeface="Segoe UI"/>
+        <a:font script="Mymr" typeface="Myanmar Text"/>
+        <a:font script="Nkoo" typeface="Ebrima"/>
+        <a:font script="Olck" typeface="Nirmala UI"/>
+        <a:font script="Osma" typeface="Ebrima"/>
+        <a:font script="Phag" typeface="Phagspa"/>
+        <a:font script="Syrn" typeface="Estrangelo Edessa"/>
+        <a:font script="Syrj" typeface="Estrangelo Edessa"/>
+        <a:font script="Syre" typeface="Estrangelo Edessa"/>
+        <a:font script="Sora" typeface="Nirmala UI"/>
+        <a:font script="Tale" typeface="Microsoft Tai Le"/>
+        <a:font script="Talu" typeface="Microsoft New Tai Lue"/>
+        <a:font script="Tfng" typeface="Ebrima"/>
+      </a:majorFont>
+      <a:minorFont>
+        <a:latin typeface="Calibri" panose="020F0502020204030204"/>
+        <a:ea typeface=""/>
+        <a:cs typeface=""/>
+        <a:font script="Jpan" typeface="游ゴシック"/>
+        <a:font script="Hang" typeface="맑은 고딕"/>
+        <a:font script="Hans" typeface="等线"/>
+        <a:font script="Hant" typeface="新細明體"/>
+        <a:font script="Arab" typeface="Arial"/>
+        <a:font script="Hebr" typeface="Arial"/>
+        <a:font script="Thai" typeface="Cordia New"/>
+        <a:font script="Ethi" typeface="Nyala"/>
+        <a:font script="Beng" typeface="Vrinda"/>
+        <a:font script="Gujr" typeface="Shruti"/>
+        <a:font script="Khmr" typeface="DaunPenh"/>
+        <a:font script="Knda" typeface="Tunga"/>
+        <a:font script="Guru" typeface="Raavi"/>
+        <a:font script="Cans" typeface="Euphemia"/>
+        <a:font script="Cher" typeface="Plantagenet Cherokee"/>
+        <a:font script="Yiii" typeface="Microsoft Yi Baiti"/>
+        <a:font script="Tibt" typeface="Microsoft Himalaya"/>
+        <a:font script="Thaa" typeface="MV Boli"/>
+        <a:font script="Deva" typeface="Mangal"/>
+        <a:font script="Telu" typeface="Gautami"/>
+        <a:font script="Taml" typeface="Latha"/>
+        <a:font script="Syrc" typeface="Estrangelo Edessa"/>
+        <a:font script="Orya" typeface="Kalinga"/>
+        <a:font script="Mlym" typeface="Kartika"/>
+        <a:font script="Laoo" typeface="DokChampa"/>
+        <a:font script="Sinh" typeface="Iskoola Pota"/>
+        <a:font script="Mong" typeface="Mongolian Baiti"/>
+        <a:font script="Viet" typeface="Arial"/>
+        <a:font script="Uigh" typeface="Microsoft Uighur"/>
+        <a:font script="Geor" typeface="Sylfaen"/>
+        <a:font script="Armn" typeface="Arial"/>
+        <a:font script="Bugi" typeface="Leelawadee UI"/>
+        <a:font script="Bopo" typeface="Microsoft JhengHei"/>
+        <a:font script="Java" typeface="Javanese Text"/>
+        <a:font script="Lisu" typeface="Segoe UI"/>
+        <a:font script="Mymr" typeface="Myanmar Text"/>
+        <a:font script="Nkoo" typeface="Ebrima"/>
+        <a:font script="Olck" typeface="Nirmala UI"/>
+        <a:font script="Osma" typeface="Ebrima"/>
+        <a:font script="Phag" typeface="Phagspa"/>
+        <a:font script="Syrn" typeface="Estrangelo Edessa"/>
+        <a:font script="Syrj" typeface="Estrangelo Edessa"/>
+        <a:font script="Syre" typeface="Estrangelo Edessa"/>
+        <a:font script="Sora" typeface="Nirmala UI"/>
+        <a:font script="Tale" typeface="Microsoft Tai Le"/>
+        <a:font script="Talu" typeface="Microsoft New Tai Lue"/>
+        <a:font script="Tfng" typeface="Ebrima"/>
+      </a:minorFont>
+    </a:fontScheme>
+    <a:fmtScheme name="Pakiet Office">
+      <a:fillStyleLst>
+        <a:solidFill>
+          <a:schemeClr val="phClr"/>
+        </a:solidFill>
+        <a:gradFill rotWithShape="1">
+          <a:gsLst>
+            <a:gs pos="0">
+              <a:schemeClr val="phClr">
+                <a:lumMod val="110000"/>
+                <a:satMod val="105000"/>
+                <a:tint val="67000"/>
+              </a:schemeClr>
+            </a:gs>
+            <a:gs pos="50000">
+              <a:schemeClr val="phClr">
+                <a:lumMod val="105000"/>
+                <a:satMod val="103000"/>
+                <a:tint val="73000"/>
+              </a:schemeClr>
+            </a:gs>
+            <a:gs pos="100000">
+              <a:schemeClr val="phClr">
+                <a:lumMod val="105000"/>
+                <a:satMod val="109000"/>
+                <a:tint val="81000"/>
+              </a:schemeClr>
+            </a:gs>
+          </a:gsLst>
+          <a:lin ang="5400000" scaled="0"/>
+        </a:gradFill>
+        <a:gradFill rotWithShape="1">
+          <a:gsLst>
+            <a:gs pos="0">
+              <a:schemeClr val="phClr">
+                <a:satMod val="103000"/>
+                <a:lumMod val="102000"/>
+                <a:tint val="94000"/>
+              </a:schemeClr>
+            </a:gs>
+            <a:gs pos="50000">
+              <a:schemeClr val="phClr">
+                <a:satMod val="110000"/>
+                <a:lumMod val="100000"/>
+                <a:shade val="100000"/>
+              </a:schemeClr>
+            </a:gs>
+            <a:gs pos="100000">
+              <a:schemeClr val="phClr">
+                <a:lumMod val="99000"/>
+                <a:satMod val="120000"/>
+                <a:shade val="78000"/>
+              </a:schemeClr>
+            </a:gs>
+          </a:gsLst>
+          <a:lin ang="5400000" scaled="0"/>
+        </a:gradFill>
+      </a:fillStyleLst>
+      <a:lnStyleLst>
+        <a:ln w="6350" cap="flat" cmpd="sng" algn="ctr">
+          <a:solidFill>
+            <a:schemeClr val="phClr"/>
+          </a:solidFill>
+          <a:prstDash val="solid"/>
+          <a:miter lim="800000"/>
+        </a:ln>
+        <a:ln w="12700" cap="flat" cmpd="sng" algn="ctr">
+          <a:solidFill>
+            <a:schemeClr val="phClr"/>
+          </a:solidFill>
+          <a:prstDash val="solid"/>
+          <a:miter lim="800000"/>
+        </a:ln>
+        <a:ln w="19050" cap="flat" cmpd="sng" algn="ctr">
+          <a:solidFill>
+            <a:schemeClr val="phClr"/>
+          </a:solidFill>
+          <a:prstDash val="solid"/>
+          <a:miter lim="800000"/>
+        </a:ln>
+      </a:lnStyleLst>
+      <a:effectStyleLst>
+        <a:effectStyle>
+          <a:effectLst/>
+        </a:effectStyle>
+        <a:effectStyle>
+          <a:effectLst/>
+        </a:effectStyle>
+        <a:effectStyle>
+          <a:effectLst>
+            <a:outerShdw blurRad="57150" dist="19050" dir="5400000" algn="ctr" rotWithShape="0">
+              <a:srgbClr val="000000">
+                <a:alpha val="63000"/>
+              </a:srgbClr>
+            </a:outerShdw>
+          </a:effectLst>
+        </a:effectStyle>
+      </a:effectStyleLst>
+      <a:bgFillStyleLst>
+        <a:solidFill>
+          <a:schemeClr val="phClr"/>
+        </a:solidFill>
+        <a:solidFill>
+          <a:schemeClr val="phClr">
+            <a:tint val="95000"/>
+            <a:satMod val="170000"/>
+          </a:schemeClr>
+        </a:solidFill>
+        <a:gradFill rotWithShape="1">
+          <a:gsLst>
+            <a:gs pos="0">
+              <a:schemeClr val="phClr">
+                <a:tint val="93000"/>
+                <a:satMod val="150000"/>
+                <a:shade val="98000"/>
+                <a:lumMod val="102000"/>
+              </a:schemeClr>
+            </a:gs>
+            <a:gs pos="50000">
+              <a:schemeClr val="phClr">
+                <a:tint val="98000"/>
+                <a:satMod val="130000"/>
+                <a:shade val="90000"/>
+                <a:lumMod val="103000"/>
+              </a:schemeClr>
+            </a:gs>
+            <a:gs pos="100000">
+              <a:schemeClr val="phClr">
+                <a:shade val="63000"/>
+                <a:satMod val="120000"/>
+              </a:schemeClr>
+            </a:gs>
+          </a:gsLst>
+          <a:lin ang="5400000" scaled="0"/>
+        </a:gradFill>
+      </a:bgFillStyleLst>
+    </a:fmtScheme>
+  </a:themeElements>
+  <a:objectDefaults/>
+  <a:extraClrSchemeLst/>
+  <a:extLst>
+    <a:ext uri="{05A4C25C-085E-4340-85A3-A5531E510DB2}">
+      <thm15:themeFamily xmlns:thm15="http://schemas.microsoft.com/office/thememl/2012/main" name="Office Theme" id="{62F939B6-93AF-4DB8-9C6B-D6C7DFDC589F}" vid="{4A3C46E8-61CC-4603-A589-7422A47A8E4A}"/>
+    </a:ext>
+  </a:extLst>
+</a:theme>
 </file>
</xml_diff>

<commit_message>
Documentation + compressed to less than 2MB
</commit_message>
<xml_diff>
--- a/Documentation - PL/ZTP Dokumentation.pptx
+++ b/Documentation - PL/ZTP Dokumentation.pptx
@@ -6002,7 +6002,7 @@
         </p:blipFill>
         <p:spPr>
           <a:xfrm>
-            <a:off x="240632" y="1209675"/>
+            <a:off x="362552" y="1209675"/>
             <a:ext cx="4883818" cy="5481837"/>
           </a:xfrm>
           <a:prstGeom prst="rect">
@@ -6871,8 +6871,8 @@
         </p:blipFill>
         <p:spPr>
           <a:xfrm>
-            <a:off x="485271" y="1181100"/>
-            <a:ext cx="11221459" cy="5511800"/>
+            <a:off x="158603" y="1025293"/>
+            <a:ext cx="11874794" cy="5832707"/>
           </a:xfrm>
           <a:prstGeom prst="rect">
             <a:avLst/>
@@ -8612,8 +8612,8 @@
         </p:nvSpPr>
         <p:spPr>
           <a:xfrm>
-            <a:off x="9239795" y="5648743"/>
-            <a:ext cx="3021874" cy="1065565"/>
+            <a:off x="9373579" y="5648743"/>
+            <a:ext cx="2717074" cy="1065565"/>
           </a:xfrm>
         </p:spPr>
         <p:txBody>
@@ -8678,10 +8678,10 @@
       </p:grpSpPr>
       <p:pic>
         <p:nvPicPr>
-          <p:cNvPr id="7" name="Obraz 6" descr="Obraz zawierający zrzut ekranu&#10;&#10;Opis wygenerowany automatycznie">
+          <p:cNvPr id="9" name="Obraz 8" descr="Obraz zawierający wewnątrz, ściana&#10;&#10;Opis wygenerowany automatycznie">
             <a:extLst>
               <a:ext uri="{FF2B5EF4-FFF2-40B4-BE49-F238E27FC236}">
-                <a16:creationId xmlns:a16="http://schemas.microsoft.com/office/drawing/2014/main" id="{B4291891-2B71-4650-A6BA-2246E9C8ED04}"/>
+                <a16:creationId xmlns:a16="http://schemas.microsoft.com/office/drawing/2014/main" id="{7A16970A-F0D6-4C2C-891F-FF08355BEA4E}"/>
               </a:ext>
             </a:extLst>
           </p:cNvPr>
@@ -8704,8 +8704,8 @@
         </p:blipFill>
         <p:spPr>
           <a:xfrm>
-            <a:off x="73436" y="0"/>
-            <a:ext cx="8146243" cy="6858000"/>
+            <a:off x="0" y="0"/>
+            <a:ext cx="12192000" cy="5662520"/>
           </a:xfrm>
           <a:prstGeom prst="rect">
             <a:avLst/>
@@ -8726,8 +8726,8 @@
         </p:nvSpPr>
         <p:spPr>
           <a:xfrm>
-            <a:off x="8395062" y="3164339"/>
-            <a:ext cx="3723502" cy="830997"/>
+            <a:off x="4702627" y="5662520"/>
+            <a:ext cx="4815841" cy="1077218"/>
           </a:xfrm>
           <a:prstGeom prst="rect">
             <a:avLst/>
@@ -8745,7 +8745,31 @@
               <a:rPr lang="pl-PL" sz="1600" dirty="0">
                 <a:latin typeface="Bahnschrift" panose="020B0502040204020203" pitchFamily="34" charset="0"/>
               </a:rPr>
-              <a:t>Zawierający interfejsy i Klasy związane z Albumem. Pozostałym modelom bazy odpowiadają zbliżone kontrolery.</a:t>
+              <a:t>Diagram przestawia interfejsy i Klasy związane z prezenterem Albumu zawarte w </a:t>
+            </a:r>
+            <a:r>
+              <a:rPr lang="pl-PL" sz="1600" dirty="0" err="1">
+                <a:latin typeface="Bahnschrift" panose="020B0502040204020203" pitchFamily="34" charset="0"/>
+              </a:rPr>
+              <a:t>MusicPlayer.UWP</a:t>
+            </a:r>
+            <a:r>
+              <a:rPr lang="pl-PL" sz="1600" dirty="0">
+                <a:latin typeface="Bahnschrift" panose="020B0502040204020203" pitchFamily="34" charset="0"/>
+              </a:rPr>
+              <a:t>. Pozostałym modelom bazy odpowiadają zbliżone (mniej lub bardziej rozbudowane) </a:t>
+            </a:r>
+            <a:r>
+              <a:rPr lang="pl-PL" sz="1600" dirty="0" err="1">
+                <a:latin typeface="Bahnschrift" panose="020B0502040204020203" pitchFamily="34" charset="0"/>
+              </a:rPr>
+              <a:t>prezentery</a:t>
+            </a:r>
+            <a:r>
+              <a:rPr lang="pl-PL" sz="1600" dirty="0">
+                <a:latin typeface="Bahnschrift" panose="020B0502040204020203" pitchFamily="34" charset="0"/>
+              </a:rPr>
+              <a:t>.</a:t>
             </a:r>
           </a:p>
         </p:txBody>
@@ -8768,8 +8792,8 @@
         </p:nvSpPr>
         <p:spPr>
           <a:xfrm>
-            <a:off x="8365207" y="2430962"/>
-            <a:ext cx="3679920" cy="923330"/>
+            <a:off x="269966" y="5862140"/>
+            <a:ext cx="3857897" cy="923330"/>
           </a:xfrm>
         </p:spPr>
         <p:txBody>
@@ -9057,8 +9081,8 @@
         </p:nvSpPr>
         <p:spPr>
           <a:xfrm>
-            <a:off x="8656628" y="5959187"/>
-            <a:ext cx="3535372" cy="738664"/>
+            <a:off x="8535217" y="5933061"/>
+            <a:ext cx="3717743" cy="830997"/>
           </a:xfrm>
           <a:prstGeom prst="rect">
             <a:avLst/>
@@ -9072,7 +9096,10 @@
           <a:p>
             <a:pPr algn="just"/>
             <a:r>
-              <a:rPr lang="pl-PL" sz="1400" b="1" dirty="0">
+              <a:rPr lang="pl-PL" sz="1600" b="1" dirty="0">
+                <a:solidFill>
+                  <a:srgbClr val="002060"/>
+                </a:solidFill>
                 <a:latin typeface="Bahnschrift" panose="020B0502040204020203" pitchFamily="34" charset="0"/>
               </a:rPr>
               <a:t>Statystyki:</a:t>
@@ -9084,27 +9111,33 @@
               <a:buChar char="§"/>
             </a:pPr>
             <a:r>
-              <a:rPr lang="pl-PL" sz="1400" dirty="0">
+              <a:rPr lang="pl-PL" sz="1600" dirty="0">
+                <a:solidFill>
+                  <a:srgbClr val="002060"/>
+                </a:solidFill>
                 <a:latin typeface="Bahnschrift" panose="020B0502040204020203" pitchFamily="34" charset="0"/>
               </a:rPr>
               <a:t>Liczba klas w projekcie </a:t>
             </a:r>
             <a:r>
-              <a:rPr lang="pl-PL" sz="1400">
+              <a:rPr lang="pl-PL" sz="1600" dirty="0">
+                <a:solidFill>
+                  <a:srgbClr val="002060"/>
+                </a:solidFill>
                 <a:latin typeface="Calibri" panose="020F0502020204030204" pitchFamily="34" charset="0"/>
                 <a:cs typeface="Calibri" panose="020F0502020204030204" pitchFamily="34" charset="0"/>
               </a:rPr>
               <a:t>≥</a:t>
             </a:r>
             <a:r>
-              <a:rPr lang="pl-PL" sz="1400">
+              <a:rPr lang="pl-PL" sz="1600" dirty="0">
+                <a:solidFill>
+                  <a:srgbClr val="002060"/>
+                </a:solidFill>
                 <a:latin typeface="Bahnschrift" panose="020B0502040204020203" pitchFamily="34" charset="0"/>
               </a:rPr>
               <a:t> 311</a:t>
             </a:r>
-            <a:endParaRPr lang="pl-PL" sz="1400" dirty="0">
-              <a:latin typeface="Bahnschrift" panose="020B0502040204020203" pitchFamily="34" charset="0"/>
-            </a:endParaRPr>
           </a:p>
           <a:p>
             <a:pPr marL="269875" indent="-182563" algn="just">
@@ -9112,20 +9145,29 @@
               <a:buChar char="§"/>
             </a:pPr>
             <a:r>
-              <a:rPr lang="pl-PL" sz="1400" dirty="0">
+              <a:rPr lang="pl-PL" sz="1600" dirty="0">
+                <a:solidFill>
+                  <a:srgbClr val="002060"/>
+                </a:solidFill>
                 <a:latin typeface="Bahnschrift" panose="020B0502040204020203" pitchFamily="34" charset="0"/>
               </a:rPr>
               <a:t>Liczba interfejsów w projekcie </a:t>
             </a:r>
             <a:r>
-              <a:rPr lang="pl-PL" sz="1400" dirty="0">
+              <a:rPr lang="pl-PL" sz="1600" dirty="0">
+                <a:solidFill>
+                  <a:srgbClr val="002060"/>
+                </a:solidFill>
                 <a:latin typeface="Calibri" panose="020F0502020204030204" pitchFamily="34" charset="0"/>
                 <a:cs typeface="Calibri" panose="020F0502020204030204" pitchFamily="34" charset="0"/>
               </a:rPr>
               <a:t>≥</a:t>
             </a:r>
             <a:r>
-              <a:rPr lang="pl-PL" sz="1400" dirty="0">
+              <a:rPr lang="pl-PL" sz="1600" dirty="0">
+                <a:solidFill>
+                  <a:srgbClr val="002060"/>
+                </a:solidFill>
                 <a:latin typeface="Bahnschrift" panose="020B0502040204020203" pitchFamily="34" charset="0"/>
               </a:rPr>
               <a:t> 24</a:t>
@@ -9235,8 +9277,8 @@
         </p:blipFill>
         <p:spPr>
           <a:xfrm>
-            <a:off x="3321558" y="1090040"/>
-            <a:ext cx="5548885" cy="5548885"/>
+            <a:off x="3255509" y="1045030"/>
+            <a:ext cx="5680982" cy="5680982"/>
           </a:xfrm>
           <a:prstGeom prst="rect">
             <a:avLst/>
@@ -9450,7 +9492,7 @@
         <p:spPr>
           <a:xfrm>
             <a:off x="8705850" y="1249680"/>
-            <a:ext cx="3554385" cy="3170099"/>
+            <a:ext cx="3554385" cy="3477875"/>
           </a:xfrm>
           <a:prstGeom prst="rect">
             <a:avLst/>
@@ -9464,16 +9506,10 @@
           <a:lstStyle/>
           <a:p>
             <a:r>
-              <a:rPr lang="pl-PL" sz="2000" b="1" dirty="0">
-                <a:latin typeface="Bahnschrift" panose="020B0502040204020203" pitchFamily="34" charset="0"/>
-              </a:rPr>
-              <a:t>Singleton</a:t>
-            </a:r>
-            <a:r>
               <a:rPr lang="pl-PL" sz="2000" dirty="0">
                 <a:latin typeface="Bahnschrift" panose="020B0502040204020203" pitchFamily="34" charset="0"/>
               </a:rPr>
-              <a:t> – kreacyjny wzorzec projektowy, użyty w celu jest ograniczenia możliwości tworzenia obiektów klasy </a:t>
+              <a:t>Singleton – kreacyjny wzorzec projektowy, użyty w celu ograniczenia możliwości tworzenia obiektów klasy </a:t>
             </a:r>
             <a:r>
               <a:rPr lang="pl-PL" sz="2000" dirty="0" err="1">
@@ -9487,6 +9523,13 @@
               </a:rPr>
               <a:t> do jednej instancji. </a:t>
             </a:r>
+          </a:p>
+          <a:p>
+            <a:endParaRPr lang="pl-PL" sz="2000" dirty="0">
+              <a:latin typeface="Bahnschrift" panose="020B0502040204020203" pitchFamily="34" charset="0"/>
+            </a:endParaRPr>
+          </a:p>
+          <a:p>
             <a:r>
               <a:rPr lang="pl-PL" sz="2000" dirty="0" err="1">
                 <a:latin typeface="Bahnschrift" panose="020B0502040204020203" pitchFamily="34" charset="0"/>
@@ -9497,7 +9540,7 @@
               <a:rPr lang="pl-PL" sz="2000" dirty="0">
                 <a:latin typeface="Bahnschrift" panose="020B0502040204020203" pitchFamily="34" charset="0"/>
               </a:rPr>
-              <a:t> jest klasą służąco do rejestrowania w bazie </a:t>
+              <a:t> jest klasą służącą do rejestrowania w bazie </a:t>
             </a:r>
             <a:r>
               <a:rPr lang="pl-PL" sz="2000" dirty="0" err="1">
@@ -9660,8 +9703,8 @@
         </p:blipFill>
         <p:spPr>
           <a:xfrm>
-            <a:off x="240632" y="1335505"/>
-            <a:ext cx="11637859" cy="4203146"/>
+            <a:off x="108282" y="1335505"/>
+            <a:ext cx="11975437" cy="4325066"/>
           </a:xfrm>
           <a:prstGeom prst="rect">
             <a:avLst/>

</xml_diff>